<commit_message>
Added slides to decks
</commit_message>
<xml_diff>
--- a/LectureSlides/14_HierarchicalBayesModels.pptx
+++ b/LectureSlides/14_HierarchicalBayesModels.pptx
@@ -23,8 +23,14 @@
     <p:sldId id="270" r:id="rId17"/>
     <p:sldId id="271" r:id="rId18"/>
     <p:sldId id="272" r:id="rId19"/>
-    <p:sldId id="273" r:id="rId20"/>
-    <p:sldId id="274" r:id="rId21"/>
+    <p:sldId id="274" r:id="rId20"/>
+    <p:sldId id="339" r:id="rId21"/>
+    <p:sldId id="341" r:id="rId22"/>
+    <p:sldId id="340" r:id="rId23"/>
+    <p:sldId id="342" r:id="rId24"/>
+    <p:sldId id="343" r:id="rId25"/>
+    <p:sldId id="345" r:id="rId26"/>
+    <p:sldId id="344" r:id="rId27"/>
   </p:sldIdLst>
   <p:sldSz cx="9144000" cy="5143500" type="screen16x9"/>
   <p:notesSz cx="6858000" cy="9144000"/>
@@ -321,7 +327,7 @@
           <a:p>
             <a:fld id="{241EB5C9-1307-BA42-ABA2-0BC069CD8E7F}" type="datetimeFigureOut">
               <a:rPr lang="en-US" smtClean="0"/>
-              <a:t>11/22/2024</a:t>
+              <a:t>11/28/2024</a:t>
             </a:fld>
             <a:endParaRPr lang="en-US"/>
           </a:p>
@@ -489,7 +495,7 @@
           <a:p>
             <a:fld id="{241EB5C9-1307-BA42-ABA2-0BC069CD8E7F}" type="datetimeFigureOut">
               <a:rPr lang="en-US" smtClean="0"/>
-              <a:t>11/22/2024</a:t>
+              <a:t>11/28/2024</a:t>
             </a:fld>
             <a:endParaRPr lang="en-US"/>
           </a:p>
@@ -667,7 +673,7 @@
           <a:p>
             <a:fld id="{241EB5C9-1307-BA42-ABA2-0BC069CD8E7F}" type="datetimeFigureOut">
               <a:rPr lang="en-US" smtClean="0"/>
-              <a:t>11/22/2024</a:t>
+              <a:t>11/28/2024</a:t>
             </a:fld>
             <a:endParaRPr lang="en-US"/>
           </a:p>
@@ -835,7 +841,7 @@
           <a:p>
             <a:fld id="{241EB5C9-1307-BA42-ABA2-0BC069CD8E7F}" type="datetimeFigureOut">
               <a:rPr lang="en-US" smtClean="0"/>
-              <a:t>11/22/2024</a:t>
+              <a:t>11/28/2024</a:t>
             </a:fld>
             <a:endParaRPr lang="en-US"/>
           </a:p>
@@ -1080,7 +1086,7 @@
           <a:p>
             <a:fld id="{241EB5C9-1307-BA42-ABA2-0BC069CD8E7F}" type="datetimeFigureOut">
               <a:rPr lang="en-US" smtClean="0"/>
-              <a:t>11/22/2024</a:t>
+              <a:t>11/28/2024</a:t>
             </a:fld>
             <a:endParaRPr lang="en-US"/>
           </a:p>
@@ -1365,7 +1371,7 @@
           <a:p>
             <a:fld id="{241EB5C9-1307-BA42-ABA2-0BC069CD8E7F}" type="datetimeFigureOut">
               <a:rPr lang="en-US" smtClean="0"/>
-              <a:t>11/22/2024</a:t>
+              <a:t>11/28/2024</a:t>
             </a:fld>
             <a:endParaRPr lang="en-US"/>
           </a:p>
@@ -1784,7 +1790,7 @@
           <a:p>
             <a:fld id="{241EB5C9-1307-BA42-ABA2-0BC069CD8E7F}" type="datetimeFigureOut">
               <a:rPr lang="en-US" smtClean="0"/>
-              <a:t>11/22/2024</a:t>
+              <a:t>11/28/2024</a:t>
             </a:fld>
             <a:endParaRPr lang="en-US"/>
           </a:p>
@@ -1901,7 +1907,7 @@
           <a:p>
             <a:fld id="{241EB5C9-1307-BA42-ABA2-0BC069CD8E7F}" type="datetimeFigureOut">
               <a:rPr lang="en-US" smtClean="0"/>
-              <a:t>11/22/2024</a:t>
+              <a:t>11/28/2024</a:t>
             </a:fld>
             <a:endParaRPr lang="en-US"/>
           </a:p>
@@ -1996,7 +2002,7 @@
           <a:p>
             <a:fld id="{241EB5C9-1307-BA42-ABA2-0BC069CD8E7F}" type="datetimeFigureOut">
               <a:rPr lang="en-US" smtClean="0"/>
-              <a:t>11/22/2024</a:t>
+              <a:t>11/28/2024</a:t>
             </a:fld>
             <a:endParaRPr lang="en-US"/>
           </a:p>
@@ -2271,7 +2277,7 @@
           <a:p>
             <a:fld id="{241EB5C9-1307-BA42-ABA2-0BC069CD8E7F}" type="datetimeFigureOut">
               <a:rPr lang="en-US" smtClean="0"/>
-              <a:t>11/22/2024</a:t>
+              <a:t>11/28/2024</a:t>
             </a:fld>
             <a:endParaRPr lang="en-US"/>
           </a:p>
@@ -2523,7 +2529,7 @@
           <a:p>
             <a:fld id="{241EB5C9-1307-BA42-ABA2-0BC069CD8E7F}" type="datetimeFigureOut">
               <a:rPr lang="en-US" smtClean="0"/>
-              <a:t>11/22/2024</a:t>
+              <a:t>11/28/2024</a:t>
             </a:fld>
             <a:endParaRPr lang="en-US"/>
           </a:p>
@@ -2734,7 +2740,7 @@
           <a:p>
             <a:fld id="{241EB5C9-1307-BA42-ABA2-0BC069CD8E7F}" type="datetimeFigureOut">
               <a:rPr lang="en-US" smtClean="0"/>
-              <a:t>11/22/2024</a:t>
+              <a:t>11/28/2024</a:t>
             </a:fld>
             <a:endParaRPr lang="en-US"/>
           </a:p>
@@ -3346,8 +3352,8 @@
           </a:p>
         </p:txBody>
       </p:sp>
-      <mc:AlternateContent xmlns:mc="http://schemas.openxmlformats.org/markup-compatibility/2006">
-        <mc:Choice xmlns:a14="http://schemas.microsoft.com/office/drawing/2010/main" Requires="a14">
+      <mc:AlternateContent xmlns:mc="http://schemas.openxmlformats.org/markup-compatibility/2006" xmlns:a14="http://schemas.microsoft.com/office/drawing/2010/main">
+        <mc:Choice Requires="a14">
           <p:sp>
             <p:nvSpPr>
               <p:cNvPr id="3" name="Content Placeholder 2"/>
@@ -3436,7 +3442,7 @@
             </p:txBody>
           </p:sp>
         </mc:Choice>
-        <mc:Fallback>
+        <mc:Fallback xmlns="">
           <p:sp>
             <p:nvSpPr>
               <p:cNvPr id="3" name="Content Placeholder 2"/>
@@ -3619,6 +3625,7 @@
               <a:buNone/>
             </a:pPr>
             <a:r>
+              <a:rPr dirty="0"/>
               <a:t>For this example we construct and compare three models:</a:t>
             </a:r>
           </a:p>
@@ -3627,7 +3634,16 @@
               <a:buAutoNum type="arabicPeriod"/>
             </a:pPr>
             <a:r>
-              <a:t>A pooled model with a single intercept and slope for all counties</a:t>
+              <a:rPr dirty="0"/>
+              <a:t>A </a:t>
+            </a:r>
+            <a:r>
+              <a:rPr b="1" dirty="0"/>
+              <a:t>pooled model </a:t>
+            </a:r>
+            <a:r>
+              <a:rPr dirty="0"/>
+              <a:t>with a single intercept and slope for all counties</a:t>
             </a:r>
           </a:p>
           <a:p>
@@ -3635,7 +3651,20 @@
               <a:buAutoNum type="arabicPeriod"/>
             </a:pPr>
             <a:r>
-              <a:t>An unpooled model with separate intercepts and slopes for each county</a:t>
+              <a:rPr dirty="0"/>
+              <a:t>An </a:t>
+            </a:r>
+            <a:r>
+              <a:rPr b="1" dirty="0" err="1"/>
+              <a:t>unpooled</a:t>
+            </a:r>
+            <a:r>
+              <a:rPr b="1" dirty="0"/>
+              <a:t> model </a:t>
+            </a:r>
+            <a:r>
+              <a:rPr dirty="0"/>
+              <a:t>with separate intercepts and slopes for each county</a:t>
             </a:r>
           </a:p>
           <a:p>
@@ -3643,12 +3672,22 @@
               <a:buAutoNum type="arabicPeriod"/>
             </a:pPr>
             <a:r>
-              <a:t>An hierarchical model with hyperpriors for all counties</a:t>
+              <a:rPr dirty="0"/>
+              <a:t>An </a:t>
+            </a:r>
+            <a:r>
+              <a:rPr b="1" dirty="0"/>
+              <a:t>hierarchical model </a:t>
+            </a:r>
+            <a:r>
+              <a:rPr dirty="0"/>
+              <a:t>with hyperpriors for all counties</a:t>
             </a:r>
           </a:p>
           <a:p>
             <a:pPr lvl="1"/>
             <a:r>
+              <a:rPr dirty="0"/>
               <a:t>Next level are slopes and intercepts for each county computed using the hyperpriors.</a:t>
             </a:r>
           </a:p>
@@ -4090,8 +4129,8 @@
           </a:p>
         </p:txBody>
       </p:sp>
-      <mc:AlternateContent xmlns:mc="http://schemas.openxmlformats.org/markup-compatibility/2006">
-        <mc:Choice xmlns:a14="http://schemas.microsoft.com/office/drawing/2010/main" Requires="a14">
+      <mc:AlternateContent xmlns:mc="http://schemas.openxmlformats.org/markup-compatibility/2006" xmlns:a14="http://schemas.microsoft.com/office/drawing/2010/main">
+        <mc:Choice Requires="a14">
           <p:sp>
             <p:nvSpPr>
               <p:cNvPr id="3" name="Content Placeholder 2"/>
@@ -4583,7 +4622,7 @@
             </p:txBody>
           </p:sp>
         </mc:Choice>
-        <mc:Fallback>
+        <mc:Fallback xmlns="">
           <p:sp>
             <p:nvSpPr>
               <p:cNvPr id="3" name="Content Placeholder 2"/>
@@ -4686,8 +4725,8 @@
           </a:p>
         </p:txBody>
       </p:sp>
-      <mc:AlternateContent xmlns:mc="http://schemas.openxmlformats.org/markup-compatibility/2006">
-        <mc:Choice xmlns:a14="http://schemas.microsoft.com/office/drawing/2010/main" Requires="a14">
+      <mc:AlternateContent xmlns:mc="http://schemas.openxmlformats.org/markup-compatibility/2006" xmlns:a14="http://schemas.microsoft.com/office/drawing/2010/main">
+        <mc:Choice Requires="a14">
           <p:sp>
             <p:nvSpPr>
               <p:cNvPr id="4" name="Text Placeholder 3">
@@ -5114,7 +5153,7 @@
             </p:txBody>
           </p:sp>
         </mc:Choice>
-        <mc:Fallback>
+        <mc:Fallback xmlns="">
           <p:sp>
             <p:nvSpPr>
               <p:cNvPr id="4" name="Text Placeholder 3">
@@ -5386,6 +5425,7 @@
                 <a:endParaRPr lang="en-US" sz="2000" dirty="0"/>
               </a:p>
               <a:p>
+                <a:pPr/>
                 <a14:m>
                   <m:oMathPara xmlns:m="http://schemas.openxmlformats.org/officeDocument/2006/math">
                     <m:oMathParaPr>
@@ -5497,7 +5537,7 @@
                         <m:begChr m:val="["/>
                         <m:endChr m:val="]"/>
                         <m:ctrlPr>
-                          <a:rPr lang="ar-AE" sz="2000">
+                          <a:rPr lang="ar-AE" sz="2000" i="1">
                             <a:latin typeface="Cambria Math" panose="02040503050406030204" pitchFamily="18" charset="0"/>
                           </a:rPr>
                         </m:ctrlPr>
@@ -5573,10 +5613,11 @@
                           <m:t>,</m:t>
                         </m:r>
                         <m:r>
-                          <a:rPr lang="ar-AE" sz="2000">
+                          <a:rPr lang="en-US" sz="2000" i="1">
                             <a:latin typeface="Cambria Math" panose="02040503050406030204" pitchFamily="18" charset="0"/>
+                            <a:ea typeface="Cambria Math" panose="02040503050406030204" pitchFamily="18" charset="0"/>
                           </a:rPr>
-                          <m:t>𝜖</m:t>
+                          <m:t>𝜀</m:t>
                         </m:r>
                       </m:e>
                     </m:d>
@@ -5805,7 +5846,7 @@
               <a:blipFill>
                 <a:blip r:embed="rId2"/>
                 <a:stretch>
-                  <a:fillRect l="-1942" t="-882" r="-2330"/>
+                  <a:fillRect l="-1942" t="-882" r="-2136"/>
                 </a:stretch>
               </a:blipFill>
             </p:spPr>
@@ -6585,7 +6626,8 @@
               <a:buNone/>
             </a:pPr>
             <a:r>
-              <a:t>Sampling Traces of the Pooled Model</a:t>
+              <a:rPr dirty="0"/>
+              <a:t>Sampling the Pooled Model</a:t>
             </a:r>
           </a:p>
         </p:txBody>
@@ -6600,20 +6642,104 @@
             <p:ph idx="1"/>
           </p:nvPr>
         </p:nvSpPr>
-        <p:spPr/>
+        <p:spPr>
+          <a:xfrm>
+            <a:off x="430530" y="980330"/>
+            <a:ext cx="8229600" cy="613409"/>
+          </a:xfrm>
+        </p:spPr>
         <p:txBody>
-          <a:bodyPr/>
+          <a:bodyPr>
+            <a:normAutofit fontScale="85000" lnSpcReduction="10000"/>
+          </a:bodyPr>
           <a:lstStyle/>
           <a:p>
             <a:pPr marL="0" lvl="0" indent="0">
               <a:buNone/>
             </a:pPr>
             <a:r>
-              <a:t>The sampling traces look reasonable for the two coefficients</a:t>
+              <a:rPr dirty="0"/>
+              <a:t>The sampling traces</a:t>
+            </a:r>
+            <a:r>
+              <a:rPr lang="en-US" dirty="0"/>
+              <a:t> and statistics</a:t>
+            </a:r>
+            <a:r>
+              <a:rPr dirty="0"/>
+              <a:t> look reasonable for the t</a:t>
+            </a:r>
+            <a:r>
+              <a:rPr lang="en-US" dirty="0"/>
+              <a:t>hree</a:t>
+            </a:r>
+            <a:r>
+              <a:rPr dirty="0"/>
+              <a:t> coefficients</a:t>
             </a:r>
           </a:p>
         </p:txBody>
       </p:sp>
+      <p:pic>
+        <p:nvPicPr>
+          <p:cNvPr id="5" name="Picture 4">
+            <a:extLst>
+              <a:ext uri="{FF2B5EF4-FFF2-40B4-BE49-F238E27FC236}">
+                <a16:creationId xmlns:a16="http://schemas.microsoft.com/office/drawing/2014/main" id="{78B45827-459A-86A8-B0EE-47A19E9C4656}"/>
+              </a:ext>
+            </a:extLst>
+          </p:cNvPr>
+          <p:cNvPicPr>
+            <a:picLocks noChangeAspect="1"/>
+          </p:cNvPicPr>
+          <p:nvPr/>
+        </p:nvPicPr>
+        <p:blipFill>
+          <a:blip r:embed="rId2"/>
+          <a:stretch>
+            <a:fillRect/>
+          </a:stretch>
+        </p:blipFill>
+        <p:spPr>
+          <a:xfrm>
+            <a:off x="895350" y="1287034"/>
+            <a:ext cx="6930390" cy="2348058"/>
+          </a:xfrm>
+          <a:prstGeom prst="rect">
+            <a:avLst/>
+          </a:prstGeom>
+        </p:spPr>
+      </p:pic>
+      <p:pic>
+        <p:nvPicPr>
+          <p:cNvPr id="7" name="Picture 6">
+            <a:extLst>
+              <a:ext uri="{FF2B5EF4-FFF2-40B4-BE49-F238E27FC236}">
+                <a16:creationId xmlns:a16="http://schemas.microsoft.com/office/drawing/2014/main" id="{39E51761-F121-DDCB-555A-ED174E0AB72D}"/>
+              </a:ext>
+            </a:extLst>
+          </p:cNvPr>
+          <p:cNvPicPr>
+            <a:picLocks noChangeAspect="1"/>
+          </p:cNvPicPr>
+          <p:nvPr/>
+        </p:nvPicPr>
+        <p:blipFill>
+          <a:blip r:embed="rId3"/>
+          <a:stretch>
+            <a:fillRect/>
+          </a:stretch>
+        </p:blipFill>
+        <p:spPr>
+          <a:xfrm>
+            <a:off x="2305049" y="3634654"/>
+            <a:ext cx="4277031" cy="1478365"/>
+          </a:xfrm>
+          <a:prstGeom prst="rect">
+            <a:avLst/>
+          </a:prstGeom>
+        </p:spPr>
+      </p:pic>
     </p:spTree>
   </p:cSld>
   <p:clrMapOvr>
@@ -6649,7 +6775,12 @@
             <p:ph type="title"/>
           </p:nvPr>
         </p:nvSpPr>
-        <p:spPr/>
+        <p:spPr>
+          <a:xfrm>
+            <a:off x="457200" y="45959"/>
+            <a:ext cx="8229600" cy="857250"/>
+          </a:xfrm>
+        </p:spPr>
         <p:txBody>
           <a:bodyPr/>
           <a:lstStyle/>
@@ -6658,14 +6789,52 @@
               <a:buNone/>
             </a:pPr>
             <a:r>
-              <a:t>Summary of Sampling of the Pooled Model</a:t>
-            </a:r>
+              <a:rPr lang="en-US" dirty="0"/>
+              <a:t>Posterior Predictive Checks for Pooled Model</a:t>
+            </a:r>
+            <a:endParaRPr dirty="0"/>
           </a:p>
         </p:txBody>
       </p:sp>
+      <p:pic>
+        <p:nvPicPr>
+          <p:cNvPr id="4" name="Picture 3">
+            <a:extLst>
+              <a:ext uri="{FF2B5EF4-FFF2-40B4-BE49-F238E27FC236}">
+                <a16:creationId xmlns:a16="http://schemas.microsoft.com/office/drawing/2014/main" id="{C73F8FB9-0F46-EF35-296E-E0A51E7F58C0}"/>
+              </a:ext>
+            </a:extLst>
+          </p:cNvPr>
+          <p:cNvPicPr>
+            <a:picLocks noChangeAspect="1"/>
+          </p:cNvPicPr>
+          <p:nvPr/>
+        </p:nvPicPr>
+        <p:blipFill>
+          <a:blip r:embed="rId2"/>
+          <a:stretch>
+            <a:fillRect/>
+          </a:stretch>
+        </p:blipFill>
+        <p:spPr>
+          <a:xfrm>
+            <a:off x="5097781" y="737275"/>
+            <a:ext cx="3882586" cy="4360266"/>
+          </a:xfrm>
+          <a:prstGeom prst="rect">
+            <a:avLst/>
+          </a:prstGeom>
+        </p:spPr>
+      </p:pic>
       <p:sp>
         <p:nvSpPr>
-          <p:cNvPr id="3" name="Content Placeholder 2"/>
+          <p:cNvPr id="5" name="Content Placeholder 2">
+            <a:extLst>
+              <a:ext uri="{FF2B5EF4-FFF2-40B4-BE49-F238E27FC236}">
+                <a16:creationId xmlns:a16="http://schemas.microsoft.com/office/drawing/2014/main" id="{E7958055-EE8D-79CD-9765-B5A9104C5E08}"/>
+              </a:ext>
+            </a:extLst>
+          </p:cNvPr>
           <p:cNvSpPr>
             <a:spLocks noGrp="1"/>
           </p:cNvSpPr>
@@ -6673,17 +6842,44 @@
             <p:ph idx="1"/>
           </p:nvPr>
         </p:nvSpPr>
-        <p:spPr/>
+        <p:spPr>
+          <a:xfrm>
+            <a:off x="430530" y="980330"/>
+            <a:ext cx="4282440" cy="3892660"/>
+          </a:xfrm>
+        </p:spPr>
         <p:txBody>
-          <a:bodyPr/>
+          <a:bodyPr>
+            <a:normAutofit/>
+          </a:bodyPr>
           <a:lstStyle/>
           <a:p>
             <a:pPr marL="0" lvl="0" indent="0">
               <a:buNone/>
             </a:pPr>
             <a:r>
-              <a:t>Betas look reasonable and the sampling statistics are good</a:t>
-            </a:r>
+              <a:rPr lang="en-US" sz="2000" dirty="0"/>
+              <a:t>Posterior predictive checks show good fit</a:t>
+            </a:r>
+          </a:p>
+          <a:p>
+            <a:r>
+              <a:rPr lang="en-US" sz="2000" dirty="0"/>
+              <a:t>Predicted close to the observed response</a:t>
+            </a:r>
+          </a:p>
+          <a:p>
+            <a:r>
+              <a:rPr lang="en-US" sz="2000" dirty="0"/>
+              <a:t>The Bayesian p-value shows some positive skew </a:t>
+            </a:r>
+          </a:p>
+          <a:p>
+            <a:r>
+              <a:rPr lang="en-US" sz="2000" dirty="0"/>
+              <a:t>Bayesian u-value is within credible interval of 1.0 </a:t>
+            </a:r>
+            <a:endParaRPr sz="2000" dirty="0"/>
           </a:p>
         </p:txBody>
       </p:sp>
@@ -6791,7 +6987,13 @@
   <p:cSld>
     <p:spTree>
       <p:nvGrpSpPr>
-        <p:cNvPr id="1" name=""/>
+        <p:cNvPr id="1" name="">
+          <a:extLst>
+            <a:ext uri="{FF2B5EF4-FFF2-40B4-BE49-F238E27FC236}">
+              <a16:creationId xmlns:a16="http://schemas.microsoft.com/office/drawing/2014/main" id="{738F1E95-A7FF-E407-917D-230080BDD034}"/>
+            </a:ext>
+          </a:extLst>
+        </p:cNvPr>
         <p:cNvGrpSpPr/>
         <p:nvPr/>
       </p:nvGrpSpPr>
@@ -6805,7 +7007,13 @@
       </p:grpSpPr>
       <p:sp>
         <p:nvSpPr>
-          <p:cNvPr id="2" name="Title 1"/>
+          <p:cNvPr id="2" name="Title 1">
+            <a:extLst>
+              <a:ext uri="{FF2B5EF4-FFF2-40B4-BE49-F238E27FC236}">
+                <a16:creationId xmlns:a16="http://schemas.microsoft.com/office/drawing/2014/main" id="{8560ABFE-58DC-2D84-02C7-0A7D0F3B0579}"/>
+              </a:ext>
+            </a:extLst>
+          </p:cNvPr>
           <p:cNvSpPr>
             <a:spLocks noGrp="1"/>
           </p:cNvSpPr>
@@ -6822,12 +7030,3498 @@
               <a:buNone/>
             </a:pPr>
             <a:r>
-              <a:t>Inference on the model parameters</a:t>
-            </a:r>
+              <a:rPr dirty="0"/>
+              <a:t>Inference on the</a:t>
+            </a:r>
+            <a:r>
+              <a:rPr lang="en-US" dirty="0"/>
+              <a:t> Pooled </a:t>
+            </a:r>
+            <a:r>
+              <a:rPr dirty="0"/>
+              <a:t> </a:t>
+            </a:r>
+            <a:r>
+              <a:rPr lang="en-US" dirty="0"/>
+              <a:t>M</a:t>
+            </a:r>
+            <a:r>
+              <a:rPr dirty="0"/>
+              <a:t>odel </a:t>
+            </a:r>
+            <a:r>
+              <a:rPr lang="en-US" dirty="0"/>
+              <a:t>P</a:t>
+            </a:r>
+            <a:r>
+              <a:rPr dirty="0"/>
+              <a:t>arameters</a:t>
+            </a:r>
+          </a:p>
+        </p:txBody>
+      </p:sp>
+      <p:pic>
+        <p:nvPicPr>
+          <p:cNvPr id="4" name="Picture 3">
+            <a:extLst>
+              <a:ext uri="{FF2B5EF4-FFF2-40B4-BE49-F238E27FC236}">
+                <a16:creationId xmlns:a16="http://schemas.microsoft.com/office/drawing/2014/main" id="{F0D9B643-9F04-A60B-D0FC-488F350174B4}"/>
+              </a:ext>
+            </a:extLst>
+          </p:cNvPr>
+          <p:cNvPicPr>
+            <a:picLocks noChangeAspect="1"/>
+          </p:cNvPicPr>
+          <p:nvPr/>
+        </p:nvPicPr>
+        <p:blipFill>
+          <a:blip r:embed="rId2"/>
+          <a:stretch>
+            <a:fillRect/>
+          </a:stretch>
+        </p:blipFill>
+        <p:spPr>
+          <a:xfrm>
+            <a:off x="4972050" y="961959"/>
+            <a:ext cx="3851969" cy="3975562"/>
+          </a:xfrm>
+          <a:prstGeom prst="rect">
+            <a:avLst/>
+          </a:prstGeom>
+        </p:spPr>
+      </p:pic>
+      <mc:AlternateContent xmlns:mc="http://schemas.openxmlformats.org/markup-compatibility/2006">
+        <mc:Choice xmlns:a14="http://schemas.microsoft.com/office/drawing/2010/main" Requires="a14">
+          <p:sp>
+            <p:nvSpPr>
+              <p:cNvPr id="5" name="Content Placeholder 2">
+                <a:extLst>
+                  <a:ext uri="{FF2B5EF4-FFF2-40B4-BE49-F238E27FC236}">
+                    <a16:creationId xmlns:a16="http://schemas.microsoft.com/office/drawing/2014/main" id="{9BA7CF00-C306-7FA9-0811-D83B973640AE}"/>
+                  </a:ext>
+                </a:extLst>
+              </p:cNvPr>
+              <p:cNvSpPr>
+                <a:spLocks noGrp="1"/>
+              </p:cNvSpPr>
+              <p:nvPr>
+                <p:ph idx="1"/>
+              </p:nvPr>
+            </p:nvSpPr>
+            <p:spPr>
+              <a:xfrm>
+                <a:off x="430530" y="1664970"/>
+                <a:ext cx="4282440" cy="3208020"/>
+              </a:xfrm>
+            </p:spPr>
+            <p:txBody>
+              <a:bodyPr>
+                <a:normAutofit/>
+              </a:bodyPr>
+              <a:lstStyle/>
+              <a:p>
+                <a:pPr marL="0" lvl="0" indent="0">
+                  <a:buNone/>
+                </a:pPr>
+                <a:r>
+                  <a:rPr lang="en-US" sz="2000" dirty="0"/>
+                  <a:t>Examine HDI of model parameters</a:t>
+                </a:r>
+              </a:p>
+              <a:p>
+                <a:r>
+                  <a:rPr lang="en-US" sz="2000" dirty="0"/>
+                  <a:t>Intercept, </a:t>
+                </a:r>
+                <a14:m>
+                  <m:oMath xmlns:m="http://schemas.openxmlformats.org/officeDocument/2006/math">
+                    <m:sSub>
+                      <m:sSubPr>
+                        <m:ctrlPr>
+                          <a:rPr lang="en-US" sz="2000" i="1" smtClean="0">
+                            <a:latin typeface="Cambria Math" panose="02040503050406030204" pitchFamily="18" charset="0"/>
+                          </a:rPr>
+                        </m:ctrlPr>
+                      </m:sSubPr>
+                      <m:e>
+                        <m:r>
+                          <a:rPr lang="en-US" sz="2000" i="1" smtClean="0">
+                            <a:latin typeface="Cambria Math" panose="02040503050406030204" pitchFamily="18" charset="0"/>
+                            <a:ea typeface="Cambria Math" panose="02040503050406030204" pitchFamily="18" charset="0"/>
+                          </a:rPr>
+                          <m:t>𝛽</m:t>
+                        </m:r>
+                      </m:e>
+                      <m:sub>
+                        <m:r>
+                          <a:rPr lang="en-US" sz="2000" b="0" i="1" smtClean="0">
+                            <a:latin typeface="Cambria Math" panose="02040503050406030204" pitchFamily="18" charset="0"/>
+                          </a:rPr>
+                          <m:t>0</m:t>
+                        </m:r>
+                      </m:sub>
+                    </m:sSub>
+                  </m:oMath>
+                </a14:m>
+                <a:r>
+                  <a:rPr lang="en-US" sz="2000" dirty="0"/>
+                  <a:t>, has narrow HDI</a:t>
+                </a:r>
+              </a:p>
+              <a:p>
+                <a:r>
+                  <a:rPr lang="en-US" sz="2000" dirty="0"/>
+                  <a:t>Slope, </a:t>
+                </a:r>
+                <a14:m>
+                  <m:oMath xmlns:m="http://schemas.openxmlformats.org/officeDocument/2006/math">
+                    <m:sSub>
+                      <m:sSubPr>
+                        <m:ctrlPr>
+                          <a:rPr lang="en-US" sz="2000" i="1" smtClean="0">
+                            <a:latin typeface="Cambria Math" panose="02040503050406030204" pitchFamily="18" charset="0"/>
+                          </a:rPr>
+                        </m:ctrlPr>
+                      </m:sSubPr>
+                      <m:e>
+                        <m:r>
+                          <a:rPr lang="en-US" sz="2000" i="1" smtClean="0">
+                            <a:latin typeface="Cambria Math" panose="02040503050406030204" pitchFamily="18" charset="0"/>
+                            <a:ea typeface="Cambria Math" panose="02040503050406030204" pitchFamily="18" charset="0"/>
+                          </a:rPr>
+                          <m:t>𝛽</m:t>
+                        </m:r>
+                      </m:e>
+                      <m:sub>
+                        <m:r>
+                          <a:rPr lang="en-US" sz="2000" b="0" i="1" smtClean="0">
+                            <a:latin typeface="Cambria Math" panose="02040503050406030204" pitchFamily="18" charset="0"/>
+                          </a:rPr>
+                          <m:t>1</m:t>
+                        </m:r>
+                      </m:sub>
+                    </m:sSub>
+                  </m:oMath>
+                </a14:m>
+                <a:r>
+                  <a:rPr lang="en-US" sz="2000" dirty="0"/>
+                  <a:t>, has a wider HDI, indicating higher uncertainty</a:t>
+                </a:r>
+              </a:p>
+              <a:p>
+                <a:r>
+                  <a:rPr lang="en-US" sz="2000" dirty="0"/>
+                  <a:t>Scale, </a:t>
+                </a:r>
+                <a14:m>
+                  <m:oMath xmlns:m="http://schemas.openxmlformats.org/officeDocument/2006/math">
+                    <m:r>
+                      <a:rPr lang="en-US" sz="2000" i="1" smtClean="0">
+                        <a:latin typeface="Cambria Math" panose="02040503050406030204" pitchFamily="18" charset="0"/>
+                        <a:ea typeface="Cambria Math" panose="02040503050406030204" pitchFamily="18" charset="0"/>
+                      </a:rPr>
+                      <m:t>𝜎</m:t>
+                    </m:r>
+                  </m:oMath>
+                </a14:m>
+                <a:r>
+                  <a:rPr lang="en-US" sz="2000" dirty="0"/>
+                  <a:t>, has narrow HDI</a:t>
+                </a:r>
+                <a:endParaRPr sz="2000" dirty="0"/>
+              </a:p>
+            </p:txBody>
+          </p:sp>
+        </mc:Choice>
+        <mc:Fallback>
+          <p:sp>
+            <p:nvSpPr>
+              <p:cNvPr id="5" name="Content Placeholder 2">
+                <a:extLst>
+                  <a:ext uri="{FF2B5EF4-FFF2-40B4-BE49-F238E27FC236}">
+                    <a16:creationId xmlns:a16="http://schemas.microsoft.com/office/drawing/2014/main" id="{9BA7CF00-C306-7FA9-0811-D83B973640AE}"/>
+                  </a:ext>
+                </a:extLst>
+              </p:cNvPr>
+              <p:cNvSpPr>
+                <a:spLocks noGrp="1" noRot="1" noChangeAspect="1" noMove="1" noResize="1" noEditPoints="1" noAdjustHandles="1" noChangeArrowheads="1" noChangeShapeType="1" noTextEdit="1"/>
+              </p:cNvSpPr>
+              <p:nvPr>
+                <p:ph idx="1"/>
+              </p:nvPr>
+            </p:nvSpPr>
+            <p:spPr>
+              <a:xfrm>
+                <a:off x="430530" y="1664970"/>
+                <a:ext cx="4282440" cy="3208020"/>
+              </a:xfrm>
+              <a:blipFill>
+                <a:blip r:embed="rId3"/>
+                <a:stretch>
+                  <a:fillRect l="-1567" t="-951"/>
+                </a:stretch>
+              </a:blipFill>
+            </p:spPr>
+            <p:txBody>
+              <a:bodyPr/>
+              <a:lstStyle/>
+              <a:p>
+                <a:r>
+                  <a:rPr lang="en-US">
+                    <a:noFill/>
+                  </a:rPr>
+                  <a:t> </a:t>
+                </a:r>
+              </a:p>
+            </p:txBody>
+          </p:sp>
+        </mc:Fallback>
+      </mc:AlternateContent>
+    </p:spTree>
+    <p:extLst>
+      <p:ext uri="{BB962C8B-B14F-4D97-AF65-F5344CB8AC3E}">
+        <p14:creationId xmlns:p14="http://schemas.microsoft.com/office/powerpoint/2010/main" val="3096665122"/>
+      </p:ext>
+    </p:extLst>
+  </p:cSld>
+  <p:clrMapOvr>
+    <a:masterClrMapping/>
+  </p:clrMapOvr>
+</p:sld>
+</file>
+
+<file path=ppt/slides/slide21.xml><?xml version="1.0" encoding="utf-8"?>
+<p:sld xmlns:a="http://schemas.openxmlformats.org/drawingml/2006/main" xmlns:r="http://schemas.openxmlformats.org/officeDocument/2006/relationships" xmlns:p="http://schemas.openxmlformats.org/presentationml/2006/main">
+  <p:cSld>
+    <p:spTree>
+      <p:nvGrpSpPr>
+        <p:cNvPr id="1" name="">
+          <a:extLst>
+            <a:ext uri="{FF2B5EF4-FFF2-40B4-BE49-F238E27FC236}">
+              <a16:creationId xmlns:a16="http://schemas.microsoft.com/office/drawing/2014/main" id="{8AC33867-7487-5410-F5F0-45764DF53A77}"/>
+            </a:ext>
+          </a:extLst>
+        </p:cNvPr>
+        <p:cNvGrpSpPr/>
+        <p:nvPr/>
+      </p:nvGrpSpPr>
+      <p:grpSpPr>
+        <a:xfrm>
+          <a:off x="0" y="0"/>
+          <a:ext cx="0" cy="0"/>
+          <a:chOff x="0" y="0"/>
+          <a:chExt cx="0" cy="0"/>
+        </a:xfrm>
+      </p:grpSpPr>
+      <p:sp>
+        <p:nvSpPr>
+          <p:cNvPr id="2" name="Title 1">
+            <a:extLst>
+              <a:ext uri="{FF2B5EF4-FFF2-40B4-BE49-F238E27FC236}">
+                <a16:creationId xmlns:a16="http://schemas.microsoft.com/office/drawing/2014/main" id="{6262BCB6-61D6-EFE7-65F0-9292366E0A4E}"/>
+              </a:ext>
+            </a:extLst>
+          </p:cNvPr>
+          <p:cNvSpPr>
+            <a:spLocks noGrp="1"/>
+          </p:cNvSpPr>
+          <p:nvPr>
+            <p:ph type="title"/>
+          </p:nvPr>
+        </p:nvSpPr>
+        <p:spPr/>
+        <p:txBody>
+          <a:bodyPr/>
+          <a:lstStyle/>
+          <a:p>
+            <a:pPr marL="0" lvl="0" indent="0">
+              <a:buNone/>
+            </a:pPr>
+            <a:r>
+              <a:rPr lang="en-US" dirty="0" err="1"/>
+              <a:t>Unp</a:t>
+            </a:r>
+            <a:r>
+              <a:rPr dirty="0" err="1"/>
+              <a:t>ooled</a:t>
+            </a:r>
+            <a:r>
+              <a:rPr dirty="0"/>
+              <a:t> Model</a:t>
+            </a:r>
+          </a:p>
+        </p:txBody>
+      </p:sp>
+      <p:sp>
+        <p:nvSpPr>
+          <p:cNvPr id="3" name="Content Placeholder 2">
+            <a:extLst>
+              <a:ext uri="{FF2B5EF4-FFF2-40B4-BE49-F238E27FC236}">
+                <a16:creationId xmlns:a16="http://schemas.microsoft.com/office/drawing/2014/main" id="{D4035494-38AC-CEAE-091F-CA5A17905F22}"/>
+              </a:ext>
+            </a:extLst>
+          </p:cNvPr>
+          <p:cNvSpPr>
+            <a:spLocks noGrp="1"/>
+          </p:cNvSpPr>
+          <p:nvPr>
+            <p:ph idx="1"/>
+          </p:nvPr>
+        </p:nvSpPr>
+        <p:spPr>
+          <a:xfrm>
+            <a:off x="457200" y="1063228"/>
+            <a:ext cx="8229600" cy="3726095"/>
+          </a:xfrm>
+        </p:spPr>
+        <p:txBody>
+          <a:bodyPr>
+            <a:normAutofit fontScale="92500" lnSpcReduction="10000"/>
+          </a:bodyPr>
+          <a:lstStyle/>
+          <a:p>
+            <a:pPr marL="0" lvl="0" indent="0">
+              <a:buNone/>
+            </a:pPr>
+            <a:r>
+              <a:rPr lang="en-US" dirty="0"/>
+              <a:t>Next we test</a:t>
+            </a:r>
+            <a:r>
+              <a:rPr dirty="0"/>
+              <a:t> a</a:t>
+            </a:r>
+            <a:r>
+              <a:rPr lang="en-US" dirty="0"/>
+              <a:t>n</a:t>
+            </a:r>
+            <a:r>
+              <a:rPr dirty="0"/>
+              <a:t> </a:t>
+            </a:r>
+            <a:r>
+              <a:rPr lang="en-US" b="1" dirty="0" err="1"/>
+              <a:t>unp</a:t>
+            </a:r>
+            <a:r>
+              <a:rPr b="1" dirty="0" err="1"/>
+              <a:t>ooled</a:t>
+            </a:r>
+            <a:r>
+              <a:rPr b="1" dirty="0"/>
+              <a:t> model</a:t>
+            </a:r>
+          </a:p>
+          <a:p>
+            <a:pPr lvl="0"/>
+            <a:r>
+              <a:rPr lang="en-US" dirty="0" err="1"/>
+              <a:t>Unp</a:t>
+            </a:r>
+            <a:r>
+              <a:rPr dirty="0" err="1"/>
+              <a:t>ooled</a:t>
+            </a:r>
+            <a:r>
+              <a:rPr dirty="0"/>
+              <a:t> model is a linear regression model of the log of Radon concentration</a:t>
+            </a:r>
+          </a:p>
+          <a:p>
+            <a:pPr lvl="0"/>
+            <a:r>
+              <a:rPr lang="en-US" dirty="0"/>
+              <a:t>Each category level has independent model coefficients </a:t>
+            </a:r>
+            <a:endParaRPr dirty="0"/>
+          </a:p>
+          <a:p>
+            <a:pPr lvl="0"/>
+            <a:r>
+              <a:rPr dirty="0"/>
+              <a:t>Coefficient values </a:t>
+            </a:r>
+            <a:r>
+              <a:rPr lang="en-US" dirty="0"/>
+              <a:t>are independently </a:t>
+            </a:r>
+            <a:r>
+              <a:rPr dirty="0"/>
+              <a:t>computed from the data </a:t>
+            </a:r>
+            <a:r>
+              <a:rPr lang="en-US" dirty="0"/>
+              <a:t>for each county</a:t>
+            </a:r>
+          </a:p>
+          <a:p>
+            <a:pPr lvl="0"/>
+            <a:r>
+              <a:rPr lang="en-US" dirty="0"/>
+              <a:t>Observations are </a:t>
+            </a:r>
+            <a:r>
+              <a:rPr lang="en-US" dirty="0" err="1"/>
+              <a:t>iid</a:t>
+            </a:r>
+            <a:r>
+              <a:rPr lang="en-US" dirty="0"/>
+              <a:t> within each county </a:t>
+            </a:r>
+            <a:endParaRPr dirty="0"/>
+          </a:p>
+          <a:p>
+            <a:pPr lvl="0"/>
+            <a:r>
+              <a:rPr dirty="0"/>
+              <a:t>We assume the observations </a:t>
+            </a:r>
+            <a:r>
+              <a:rPr b="1" dirty="0"/>
+              <a:t>within</a:t>
+            </a:r>
+            <a:r>
+              <a:rPr dirty="0"/>
+              <a:t> each county are </a:t>
+            </a:r>
+            <a:r>
+              <a:rPr b="1" dirty="0">
+                <a:hlinkClick r:id="rId2"/>
+              </a:rPr>
+              <a:t>exchangeable</a:t>
+            </a:r>
+            <a:r>
+              <a:rPr b="1" dirty="0"/>
+              <a:t> </a:t>
+            </a:r>
+            <a:r>
+              <a:rPr dirty="0"/>
+              <a:t>with each other</a:t>
+            </a:r>
+            <a:r>
+              <a:rPr lang="en-US" dirty="0"/>
+              <a:t>, but not between counties</a:t>
+            </a:r>
+          </a:p>
+          <a:p>
+            <a:pPr lvl="0"/>
+            <a:r>
+              <a:rPr lang="en-US" dirty="0"/>
+              <a:t>Can pool some coefficients, e.g. dispersion </a:t>
+            </a:r>
+            <a:endParaRPr dirty="0"/>
           </a:p>
         </p:txBody>
       </p:sp>
     </p:spTree>
+    <p:extLst>
+      <p:ext uri="{BB962C8B-B14F-4D97-AF65-F5344CB8AC3E}">
+        <p14:creationId xmlns:p14="http://schemas.microsoft.com/office/powerpoint/2010/main" val="1624445619"/>
+      </p:ext>
+    </p:extLst>
+  </p:cSld>
+  <p:clrMapOvr>
+    <a:masterClrMapping/>
+  </p:clrMapOvr>
+</p:sld>
+</file>
+
+<file path=ppt/slides/slide22.xml><?xml version="1.0" encoding="utf-8"?>
+<p:sld xmlns:a="http://schemas.openxmlformats.org/drawingml/2006/main" xmlns:r="http://schemas.openxmlformats.org/officeDocument/2006/relationships" xmlns:p="http://schemas.openxmlformats.org/presentationml/2006/main">
+  <p:cSld>
+    <p:spTree>
+      <p:nvGrpSpPr>
+        <p:cNvPr id="1" name="">
+          <a:extLst>
+            <a:ext uri="{FF2B5EF4-FFF2-40B4-BE49-F238E27FC236}">
+              <a16:creationId xmlns:a16="http://schemas.microsoft.com/office/drawing/2014/main" id="{7254184E-B22C-E8E0-3A16-01C7A845E619}"/>
+            </a:ext>
+          </a:extLst>
+        </p:cNvPr>
+        <p:cNvGrpSpPr/>
+        <p:nvPr/>
+      </p:nvGrpSpPr>
+      <p:grpSpPr>
+        <a:xfrm>
+          <a:off x="0" y="0"/>
+          <a:ext cx="0" cy="0"/>
+          <a:chOff x="0" y="0"/>
+          <a:chExt cx="0" cy="0"/>
+        </a:xfrm>
+      </p:grpSpPr>
+      <p:sp>
+        <p:nvSpPr>
+          <p:cNvPr id="2" name="Title 1">
+            <a:extLst>
+              <a:ext uri="{FF2B5EF4-FFF2-40B4-BE49-F238E27FC236}">
+                <a16:creationId xmlns:a16="http://schemas.microsoft.com/office/drawing/2014/main" id="{28FEF3E0-AA0E-8CFC-6EA4-E8D39A958A8F}"/>
+              </a:ext>
+            </a:extLst>
+          </p:cNvPr>
+          <p:cNvSpPr>
+            <a:spLocks noGrp="1"/>
+          </p:cNvSpPr>
+          <p:nvPr>
+            <p:ph type="title"/>
+          </p:nvPr>
+        </p:nvSpPr>
+        <p:spPr/>
+        <p:txBody>
+          <a:bodyPr/>
+          <a:lstStyle/>
+          <a:p>
+            <a:pPr marL="0" lvl="0" indent="0">
+              <a:buNone/>
+            </a:pPr>
+            <a:r>
+              <a:rPr dirty="0"/>
+              <a:t>Pooled Model</a:t>
+            </a:r>
+          </a:p>
+        </p:txBody>
+      </p:sp>
+      <mc:AlternateContent xmlns:mc="http://schemas.openxmlformats.org/markup-compatibility/2006">
+        <mc:Choice xmlns:a14="http://schemas.microsoft.com/office/drawing/2010/main" Requires="a14">
+          <p:sp>
+            <p:nvSpPr>
+              <p:cNvPr id="3" name="Content Placeholder 2">
+                <a:extLst>
+                  <a:ext uri="{FF2B5EF4-FFF2-40B4-BE49-F238E27FC236}">
+                    <a16:creationId xmlns:a16="http://schemas.microsoft.com/office/drawing/2014/main" id="{B170DC6C-EB64-0738-AB85-446DAD53AA28}"/>
+                  </a:ext>
+                </a:extLst>
+              </p:cNvPr>
+              <p:cNvSpPr>
+                <a:spLocks noGrp="1"/>
+              </p:cNvSpPr>
+              <p:nvPr>
+                <p:ph idx="1"/>
+              </p:nvPr>
+            </p:nvSpPr>
+            <p:spPr/>
+            <p:txBody>
+              <a:bodyPr>
+                <a:normAutofit fontScale="85000" lnSpcReduction="20000"/>
+              </a:bodyPr>
+              <a:lstStyle/>
+              <a:p>
+                <a:pPr marL="0" lvl="0" indent="0">
+                  <a:buNone/>
+                </a:pPr>
+                <a:r>
+                  <a:rPr lang="en-US" dirty="0"/>
+                  <a:t>Next we test an </a:t>
+                </a:r>
+                <a:r>
+                  <a:rPr lang="en-US" b="1" dirty="0" err="1"/>
+                  <a:t>unpooled</a:t>
+                </a:r>
+                <a:r>
+                  <a:rPr lang="en-US" b="1" dirty="0"/>
+                  <a:t> model</a:t>
+                </a:r>
+              </a:p>
+              <a:p>
+                <a:pPr lvl="0"/>
+                <a:r>
+                  <a:rPr lang="en-US" dirty="0"/>
+                  <a:t>Typically for a regression model the </a:t>
+                </a:r>
+                <a:r>
+                  <a:rPr lang="en-US" dirty="0" err="1"/>
+                  <a:t>unpooled</a:t>
+                </a:r>
+                <a:r>
+                  <a:rPr lang="en-US" dirty="0"/>
+                  <a:t> model uses a Normal likelihood model:</a:t>
+                </a:r>
+              </a:p>
+              <a:p>
+                <a:pPr marL="0" lvl="0" indent="0">
+                  <a:buNone/>
+                </a:pPr>
+                <a14:m>
+                  <m:oMathPara xmlns:m="http://schemas.openxmlformats.org/officeDocument/2006/math">
+                    <m:oMathParaPr>
+                      <m:jc m:val="centerGroup"/>
+                    </m:oMathParaPr>
+                    <m:oMath xmlns:m="http://schemas.openxmlformats.org/officeDocument/2006/math">
+                      <m:r>
+                        <a:rPr lang="en-US" b="0" i="1" smtClean="0">
+                          <a:latin typeface="Cambria Math" panose="02040503050406030204" pitchFamily="18" charset="0"/>
+                        </a:rPr>
+                        <m:t>𝑙𝑜𝑔</m:t>
+                      </m:r>
+                      <m:d>
+                        <m:dPr>
+                          <m:ctrlPr>
+                            <a:rPr lang="en-US" b="0" i="1" smtClean="0">
+                              <a:latin typeface="Cambria Math" panose="02040503050406030204" pitchFamily="18" charset="0"/>
+                            </a:rPr>
+                          </m:ctrlPr>
+                        </m:dPr>
+                        <m:e>
+                          <m:r>
+                            <a:rPr lang="en-US" b="0" i="1" smtClean="0">
+                              <a:latin typeface="Cambria Math" panose="02040503050406030204" pitchFamily="18" charset="0"/>
+                            </a:rPr>
+                            <m:t>𝑟𝑎𝑑𝑜𝑛</m:t>
+                          </m:r>
+                        </m:e>
+                      </m:d>
+                      <m:r>
+                        <a:rPr lang="en-US" b="0" i="1" smtClean="0">
+                          <a:latin typeface="Cambria Math" panose="02040503050406030204" pitchFamily="18" charset="0"/>
+                          <a:ea typeface="Cambria Math" panose="02040503050406030204" pitchFamily="18" charset="0"/>
+                        </a:rPr>
+                        <m:t>~</m:t>
+                      </m:r>
+                      <m:r>
+                        <a:rPr lang="en-US" b="0" i="1" smtClean="0">
+                          <a:latin typeface="Cambria Math" panose="02040503050406030204" pitchFamily="18" charset="0"/>
+                          <a:ea typeface="Cambria Math" panose="02040503050406030204" pitchFamily="18" charset="0"/>
+                        </a:rPr>
+                        <m:t>𝑁</m:t>
+                      </m:r>
+                      <m:d>
+                        <m:dPr>
+                          <m:ctrlPr>
+                            <a:rPr lang="en-US" b="0" i="1" smtClean="0">
+                              <a:latin typeface="Cambria Math" panose="02040503050406030204" pitchFamily="18" charset="0"/>
+                              <a:ea typeface="Cambria Math" panose="02040503050406030204" pitchFamily="18" charset="0"/>
+                            </a:rPr>
+                          </m:ctrlPr>
+                        </m:dPr>
+                        <m:e>
+                          <m:sSub>
+                            <m:sSubPr>
+                              <m:ctrlPr>
+                                <a:rPr lang="en-US" i="1">
+                                  <a:latin typeface="Cambria Math" panose="02040503050406030204" pitchFamily="18" charset="0"/>
+                                  <a:ea typeface="Cambria Math" panose="02040503050406030204" pitchFamily="18" charset="0"/>
+                                </a:rPr>
+                              </m:ctrlPr>
+                            </m:sSubPr>
+                            <m:e>
+                              <m:r>
+                                <a:rPr lang="en-US" i="1">
+                                  <a:latin typeface="Cambria Math" panose="02040503050406030204" pitchFamily="18" charset="0"/>
+                                  <a:ea typeface="Cambria Math" panose="02040503050406030204" pitchFamily="18" charset="0"/>
+                                </a:rPr>
+                                <m:t>𝜇</m:t>
+                              </m:r>
+                            </m:e>
+                            <m:sub>
+                              <m:r>
+                                <a:rPr lang="en-US" i="1">
+                                  <a:latin typeface="Cambria Math" panose="02040503050406030204" pitchFamily="18" charset="0"/>
+                                  <a:ea typeface="Cambria Math" panose="02040503050406030204" pitchFamily="18" charset="0"/>
+                                </a:rPr>
+                                <m:t>𝑐</m:t>
+                              </m:r>
+                            </m:sub>
+                          </m:sSub>
+                          <m:r>
+                            <a:rPr lang="en-US" b="0" i="1" smtClean="0">
+                              <a:latin typeface="Cambria Math" panose="02040503050406030204" pitchFamily="18" charset="0"/>
+                              <a:ea typeface="Cambria Math" panose="02040503050406030204" pitchFamily="18" charset="0"/>
+                            </a:rPr>
+                            <m:t>,</m:t>
+                          </m:r>
+                          <m:r>
+                            <a:rPr lang="en-US" b="0" i="1" smtClean="0">
+                              <a:latin typeface="Cambria Math" panose="02040503050406030204" pitchFamily="18" charset="0"/>
+                              <a:ea typeface="Cambria Math" panose="02040503050406030204" pitchFamily="18" charset="0"/>
+                            </a:rPr>
+                            <m:t>𝜀</m:t>
+                          </m:r>
+                        </m:e>
+                      </m:d>
+                    </m:oMath>
+                  </m:oMathPara>
+                </a14:m>
+                <a:endParaRPr lang="en-US" dirty="0"/>
+              </a:p>
+              <a:p>
+                <a:pPr marL="0" lvl="0" indent="0">
+                  <a:buNone/>
+                </a:pPr>
+                <a14:m>
+                  <m:oMathPara xmlns:m="http://schemas.openxmlformats.org/officeDocument/2006/math">
+                    <m:oMathParaPr>
+                      <m:jc m:val="centerGroup"/>
+                    </m:oMathParaPr>
+                    <m:oMath xmlns:m="http://schemas.openxmlformats.org/officeDocument/2006/math">
+                      <m:sSub>
+                        <m:sSubPr>
+                          <m:ctrlPr>
+                            <a:rPr lang="en-US" i="1">
+                              <a:latin typeface="Cambria Math" panose="02040503050406030204" pitchFamily="18" charset="0"/>
+                              <a:ea typeface="Cambria Math" panose="02040503050406030204" pitchFamily="18" charset="0"/>
+                            </a:rPr>
+                          </m:ctrlPr>
+                        </m:sSubPr>
+                        <m:e>
+                          <m:r>
+                            <a:rPr lang="en-US" i="1">
+                              <a:latin typeface="Cambria Math" panose="02040503050406030204" pitchFamily="18" charset="0"/>
+                              <a:ea typeface="Cambria Math" panose="02040503050406030204" pitchFamily="18" charset="0"/>
+                            </a:rPr>
+                            <m:t>𝜇</m:t>
+                          </m:r>
+                        </m:e>
+                        <m:sub>
+                          <m:r>
+                            <a:rPr lang="en-US" i="1">
+                              <a:latin typeface="Cambria Math" panose="02040503050406030204" pitchFamily="18" charset="0"/>
+                              <a:ea typeface="Cambria Math" panose="02040503050406030204" pitchFamily="18" charset="0"/>
+                            </a:rPr>
+                            <m:t>𝑐</m:t>
+                          </m:r>
+                        </m:sub>
+                      </m:sSub>
+                      <m:r>
+                        <a:rPr lang="en-US" b="0" i="1" smtClean="0">
+                          <a:latin typeface="Cambria Math" panose="02040503050406030204" pitchFamily="18" charset="0"/>
+                          <a:ea typeface="Cambria Math" panose="02040503050406030204" pitchFamily="18" charset="0"/>
+                        </a:rPr>
+                        <m:t>=</m:t>
+                      </m:r>
+                      <m:sSub>
+                        <m:sSubPr>
+                          <m:ctrlPr>
+                            <a:rPr lang="en-US" i="1" smtClean="0">
+                              <a:latin typeface="Cambria Math" panose="02040503050406030204" pitchFamily="18" charset="0"/>
+                              <a:ea typeface="Cambria Math" panose="02040503050406030204" pitchFamily="18" charset="0"/>
+                            </a:rPr>
+                          </m:ctrlPr>
+                        </m:sSubPr>
+                        <m:e>
+                          <m:r>
+                            <a:rPr lang="en-US" i="1">
+                              <a:latin typeface="Cambria Math" panose="02040503050406030204" pitchFamily="18" charset="0"/>
+                              <a:ea typeface="Cambria Math" panose="02040503050406030204" pitchFamily="18" charset="0"/>
+                            </a:rPr>
+                            <m:t>𝛽</m:t>
+                          </m:r>
+                        </m:e>
+                        <m:sub>
+                          <m:r>
+                            <a:rPr lang="en-US" b="0" i="1" smtClean="0">
+                              <a:latin typeface="Cambria Math" panose="02040503050406030204" pitchFamily="18" charset="0"/>
+                              <a:ea typeface="Cambria Math" panose="02040503050406030204" pitchFamily="18" charset="0"/>
+                            </a:rPr>
+                            <m:t>0</m:t>
+                          </m:r>
+                          <m:r>
+                            <a:rPr lang="en-US" b="0" i="1" smtClean="0">
+                              <a:latin typeface="Cambria Math" panose="02040503050406030204" pitchFamily="18" charset="0"/>
+                              <a:ea typeface="Cambria Math" panose="02040503050406030204" pitchFamily="18" charset="0"/>
+                            </a:rPr>
+                            <m:t>,</m:t>
+                          </m:r>
+                          <m:r>
+                            <a:rPr lang="en-US" b="0" i="1" smtClean="0">
+                              <a:latin typeface="Cambria Math" panose="02040503050406030204" pitchFamily="18" charset="0"/>
+                              <a:ea typeface="Cambria Math" panose="02040503050406030204" pitchFamily="18" charset="0"/>
+                            </a:rPr>
+                            <m:t>𝑐</m:t>
+                          </m:r>
+                        </m:sub>
+                      </m:sSub>
+                      <m:r>
+                        <a:rPr lang="en-US" b="0" i="1" smtClean="0">
+                          <a:latin typeface="Cambria Math" panose="02040503050406030204" pitchFamily="18" charset="0"/>
+                          <a:ea typeface="Cambria Math" panose="02040503050406030204" pitchFamily="18" charset="0"/>
+                        </a:rPr>
+                        <m:t>+</m:t>
+                      </m:r>
+                      <m:sSub>
+                        <m:sSubPr>
+                          <m:ctrlPr>
+                            <a:rPr lang="en-US" b="0" i="1" smtClean="0">
+                              <a:latin typeface="Cambria Math" panose="02040503050406030204" pitchFamily="18" charset="0"/>
+                              <a:ea typeface="Cambria Math" panose="02040503050406030204" pitchFamily="18" charset="0"/>
+                            </a:rPr>
+                          </m:ctrlPr>
+                        </m:sSubPr>
+                        <m:e>
+                          <m:r>
+                            <a:rPr lang="en-US" i="1">
+                              <a:latin typeface="Cambria Math" panose="02040503050406030204" pitchFamily="18" charset="0"/>
+                              <a:ea typeface="Cambria Math" panose="02040503050406030204" pitchFamily="18" charset="0"/>
+                            </a:rPr>
+                            <m:t>𝛽</m:t>
+                          </m:r>
+                        </m:e>
+                        <m:sub>
+                          <m:r>
+                            <a:rPr lang="en-US" b="0" i="1" smtClean="0">
+                              <a:latin typeface="Cambria Math" panose="02040503050406030204" pitchFamily="18" charset="0"/>
+                              <a:ea typeface="Cambria Math" panose="02040503050406030204" pitchFamily="18" charset="0"/>
+                            </a:rPr>
+                            <m:t>1</m:t>
+                          </m:r>
+                          <m:r>
+                            <a:rPr lang="en-US" b="0" i="1" smtClean="0">
+                              <a:latin typeface="Cambria Math" panose="02040503050406030204" pitchFamily="18" charset="0"/>
+                              <a:ea typeface="Cambria Math" panose="02040503050406030204" pitchFamily="18" charset="0"/>
+                            </a:rPr>
+                            <m:t>,</m:t>
+                          </m:r>
+                          <m:r>
+                            <a:rPr lang="en-US" b="0" i="1" smtClean="0">
+                              <a:latin typeface="Cambria Math" panose="02040503050406030204" pitchFamily="18" charset="0"/>
+                              <a:ea typeface="Cambria Math" panose="02040503050406030204" pitchFamily="18" charset="0"/>
+                            </a:rPr>
+                            <m:t>𝑐</m:t>
+                          </m:r>
+                        </m:sub>
+                      </m:sSub>
+                      <m:sSub>
+                        <m:sSubPr>
+                          <m:ctrlPr>
+                            <a:rPr lang="en-US" i="1" smtClean="0">
+                              <a:latin typeface="Cambria Math" panose="02040503050406030204" pitchFamily="18" charset="0"/>
+                              <a:ea typeface="Cambria Math" panose="02040503050406030204" pitchFamily="18" charset="0"/>
+                            </a:rPr>
+                          </m:ctrlPr>
+                        </m:sSubPr>
+                        <m:e>
+                          <m:r>
+                            <a:rPr lang="en-US" b="0" i="1" smtClean="0">
+                              <a:latin typeface="Cambria Math" panose="02040503050406030204" pitchFamily="18" charset="0"/>
+                              <a:ea typeface="Cambria Math" panose="02040503050406030204" pitchFamily="18" charset="0"/>
+                            </a:rPr>
+                            <m:t>𝑥</m:t>
+                          </m:r>
+                        </m:e>
+                        <m:sub>
+                          <m:r>
+                            <a:rPr lang="en-US" i="1">
+                              <a:latin typeface="Cambria Math" panose="02040503050406030204" pitchFamily="18" charset="0"/>
+                              <a:ea typeface="Cambria Math" panose="02040503050406030204" pitchFamily="18" charset="0"/>
+                            </a:rPr>
+                            <m:t>𝑐</m:t>
+                          </m:r>
+                        </m:sub>
+                      </m:sSub>
+                    </m:oMath>
+                  </m:oMathPara>
+                </a14:m>
+                <a:endParaRPr lang="en-US" dirty="0"/>
+              </a:p>
+              <a:p>
+                <a:pPr marL="342900" lvl="1" indent="0">
+                  <a:buNone/>
+                </a:pPr>
+                <a:r>
+                  <a:rPr lang="en-US" dirty="0"/>
+                  <a:t>Where the subscript </a:t>
+                </a:r>
+                <a14:m>
+                  <m:oMath xmlns:m="http://schemas.openxmlformats.org/officeDocument/2006/math">
+                    <m:r>
+                      <a:rPr lang="en-US" b="0" i="1" smtClean="0">
+                        <a:latin typeface="Cambria Math" panose="02040503050406030204" pitchFamily="18" charset="0"/>
+                      </a:rPr>
+                      <m:t>𝑐</m:t>
+                    </m:r>
+                  </m:oMath>
+                </a14:m>
+                <a:r>
+                  <a:rPr lang="en-US" dirty="0"/>
+                  <a:t> indicates values specific to a county</a:t>
+                </a:r>
+              </a:p>
+              <a:p>
+                <a:r>
+                  <a:rPr lang="en-US" dirty="0"/>
+                  <a:t>The value of </a:t>
+                </a:r>
+                <a14:m>
+                  <m:oMath xmlns:m="http://schemas.openxmlformats.org/officeDocument/2006/math">
+                    <m:r>
+                      <a:rPr lang="en-US">
+                        <a:latin typeface="Cambria Math" panose="02040503050406030204" pitchFamily="18" charset="0"/>
+                      </a:rPr>
+                      <m:t>𝜇</m:t>
+                    </m:r>
+                  </m:oMath>
+                </a14:m>
+                <a:r>
+                  <a:rPr lang="en-US" dirty="0"/>
+                  <a:t> is computed </a:t>
+                </a:r>
+                <a:r>
+                  <a:rPr lang="en-US" b="1" dirty="0"/>
+                  <a:t>deterministically</a:t>
+                </a:r>
+                <a:r>
+                  <a:rPr lang="en-US" dirty="0"/>
+                  <a:t> using the model coefficient vector,</a:t>
+                </a:r>
+                <a14:m>
+                  <m:oMath xmlns:m="http://schemas.openxmlformats.org/officeDocument/2006/math">
+                    <m:d>
+                      <m:dPr>
+                        <m:begChr m:val="["/>
+                        <m:endChr m:val="]"/>
+                        <m:ctrlPr>
+                          <a:rPr lang="ar-AE" i="1">
+                            <a:latin typeface="Cambria Math" panose="02040503050406030204" pitchFamily="18" charset="0"/>
+                          </a:rPr>
+                        </m:ctrlPr>
+                      </m:dPr>
+                      <m:e>
+                        <m:sSub>
+                          <m:sSubPr>
+                            <m:ctrlPr>
+                              <a:rPr lang="en-US" i="1">
+                                <a:latin typeface="Cambria Math" panose="02040503050406030204" pitchFamily="18" charset="0"/>
+                                <a:ea typeface="Cambria Math" panose="02040503050406030204" pitchFamily="18" charset="0"/>
+                              </a:rPr>
+                            </m:ctrlPr>
+                          </m:sSubPr>
+                          <m:e>
+                            <m:r>
+                              <a:rPr lang="en-US" i="1">
+                                <a:latin typeface="Cambria Math" panose="02040503050406030204" pitchFamily="18" charset="0"/>
+                                <a:ea typeface="Cambria Math" panose="02040503050406030204" pitchFamily="18" charset="0"/>
+                              </a:rPr>
+                              <m:t>𝛽</m:t>
+                            </m:r>
+                          </m:e>
+                          <m:sub>
+                            <m:r>
+                              <a:rPr lang="en-US" i="1">
+                                <a:latin typeface="Cambria Math" panose="02040503050406030204" pitchFamily="18" charset="0"/>
+                                <a:ea typeface="Cambria Math" panose="02040503050406030204" pitchFamily="18" charset="0"/>
+                              </a:rPr>
+                              <m:t>0</m:t>
+                            </m:r>
+                            <m:r>
+                              <a:rPr lang="en-US" b="0" i="1" smtClean="0">
+                                <a:latin typeface="Cambria Math" panose="02040503050406030204" pitchFamily="18" charset="0"/>
+                                <a:ea typeface="Cambria Math" panose="02040503050406030204" pitchFamily="18" charset="0"/>
+                              </a:rPr>
+                              <m:t>,</m:t>
+                            </m:r>
+                            <m:r>
+                              <a:rPr lang="en-US" b="0" i="1" smtClean="0">
+                                <a:latin typeface="Cambria Math" panose="02040503050406030204" pitchFamily="18" charset="0"/>
+                                <a:ea typeface="Cambria Math" panose="02040503050406030204" pitchFamily="18" charset="0"/>
+                              </a:rPr>
+                              <m:t>𝑐</m:t>
+                            </m:r>
+                          </m:sub>
+                        </m:sSub>
+                        <m:r>
+                          <a:rPr lang="en-US" i="1">
+                            <a:latin typeface="Cambria Math" panose="02040503050406030204" pitchFamily="18" charset="0"/>
+                            <a:ea typeface="Cambria Math" panose="02040503050406030204" pitchFamily="18" charset="0"/>
+                          </a:rPr>
+                          <m:t>,</m:t>
+                        </m:r>
+                        <m:sSub>
+                          <m:sSubPr>
+                            <m:ctrlPr>
+                              <a:rPr lang="en-US" i="1">
+                                <a:latin typeface="Cambria Math" panose="02040503050406030204" pitchFamily="18" charset="0"/>
+                                <a:ea typeface="Cambria Math" panose="02040503050406030204" pitchFamily="18" charset="0"/>
+                              </a:rPr>
+                            </m:ctrlPr>
+                          </m:sSubPr>
+                          <m:e>
+                            <m:r>
+                              <a:rPr lang="en-US" i="1">
+                                <a:latin typeface="Cambria Math" panose="02040503050406030204" pitchFamily="18" charset="0"/>
+                                <a:ea typeface="Cambria Math" panose="02040503050406030204" pitchFamily="18" charset="0"/>
+                              </a:rPr>
+                              <m:t> </m:t>
+                            </m:r>
+                            <m:r>
+                              <a:rPr lang="en-US" i="1">
+                                <a:latin typeface="Cambria Math" panose="02040503050406030204" pitchFamily="18" charset="0"/>
+                                <a:ea typeface="Cambria Math" panose="02040503050406030204" pitchFamily="18" charset="0"/>
+                              </a:rPr>
+                              <m:t>𝛽</m:t>
+                            </m:r>
+                          </m:e>
+                          <m:sub>
+                            <m:r>
+                              <a:rPr lang="en-US" i="1">
+                                <a:latin typeface="Cambria Math" panose="02040503050406030204" pitchFamily="18" charset="0"/>
+                                <a:ea typeface="Cambria Math" panose="02040503050406030204" pitchFamily="18" charset="0"/>
+                              </a:rPr>
+                              <m:t>1</m:t>
+                            </m:r>
+                            <m:r>
+                              <a:rPr lang="en-US" b="0" i="1" smtClean="0">
+                                <a:latin typeface="Cambria Math" panose="02040503050406030204" pitchFamily="18" charset="0"/>
+                                <a:ea typeface="Cambria Math" panose="02040503050406030204" pitchFamily="18" charset="0"/>
+                              </a:rPr>
+                              <m:t>,</m:t>
+                            </m:r>
+                            <m:r>
+                              <a:rPr lang="en-US" b="0" i="1" smtClean="0">
+                                <a:latin typeface="Cambria Math" panose="02040503050406030204" pitchFamily="18" charset="0"/>
+                                <a:ea typeface="Cambria Math" panose="02040503050406030204" pitchFamily="18" charset="0"/>
+                              </a:rPr>
+                              <m:t>𝑐</m:t>
+                            </m:r>
+                          </m:sub>
+                        </m:sSub>
+                      </m:e>
+                    </m:d>
+                  </m:oMath>
+                </a14:m>
+                <a:endParaRPr lang="en-US" dirty="0"/>
+              </a:p>
+              <a:p>
+                <a:pPr marL="0" indent="0">
+                  <a:buNone/>
+                </a:pPr>
+                <a14:m>
+                  <m:oMathPara xmlns:m="http://schemas.openxmlformats.org/officeDocument/2006/math">
+                    <m:oMathParaPr>
+                      <m:jc m:val="centerGroup"/>
+                    </m:oMathParaPr>
+                    <m:oMath xmlns:m="http://schemas.openxmlformats.org/officeDocument/2006/math">
+                      <m:r>
+                        <a:rPr lang="en-US" b="0" i="1" smtClean="0">
+                          <a:latin typeface="Cambria Math" panose="02040503050406030204" pitchFamily="18" charset="0"/>
+                        </a:rPr>
+                        <m:t>𝑙𝑜𝑔</m:t>
+                      </m:r>
+                      <m:d>
+                        <m:dPr>
+                          <m:ctrlPr>
+                            <a:rPr lang="en-US" b="0" i="1" smtClean="0">
+                              <a:latin typeface="Cambria Math" panose="02040503050406030204" pitchFamily="18" charset="0"/>
+                            </a:rPr>
+                          </m:ctrlPr>
+                        </m:dPr>
+                        <m:e>
+                          <m:acc>
+                            <m:accPr>
+                              <m:chr m:val="̂"/>
+                              <m:ctrlPr>
+                                <a:rPr lang="en-US" b="0" i="1" smtClean="0">
+                                  <a:latin typeface="Cambria Math" panose="02040503050406030204" pitchFamily="18" charset="0"/>
+                                </a:rPr>
+                              </m:ctrlPr>
+                            </m:accPr>
+                            <m:e>
+                              <m:sSub>
+                                <m:sSubPr>
+                                  <m:ctrlPr>
+                                    <a:rPr lang="en-US" i="1">
+                                      <a:latin typeface="Cambria Math" panose="02040503050406030204" pitchFamily="18" charset="0"/>
+                                      <a:ea typeface="Cambria Math" panose="02040503050406030204" pitchFamily="18" charset="0"/>
+                                    </a:rPr>
+                                  </m:ctrlPr>
+                                </m:sSubPr>
+                                <m:e>
+                                  <m:r>
+                                    <a:rPr lang="en-US" b="0" i="1" smtClean="0">
+                                      <a:latin typeface="Cambria Math" panose="02040503050406030204" pitchFamily="18" charset="0"/>
+                                      <a:ea typeface="Cambria Math" panose="02040503050406030204" pitchFamily="18" charset="0"/>
+                                    </a:rPr>
+                                    <m:t>𝑟𝑎𝑑</m:t>
+                                  </m:r>
+                                </m:e>
+                                <m:sub>
+                                  <m:r>
+                                    <a:rPr lang="en-US" i="1">
+                                      <a:latin typeface="Cambria Math" panose="02040503050406030204" pitchFamily="18" charset="0"/>
+                                      <a:ea typeface="Cambria Math" panose="02040503050406030204" pitchFamily="18" charset="0"/>
+                                    </a:rPr>
+                                    <m:t>𝑐</m:t>
+                                  </m:r>
+                                </m:sub>
+                              </m:sSub>
+                            </m:e>
+                          </m:acc>
+                        </m:e>
+                      </m:d>
+                      <m:r>
+                        <a:rPr lang="en-US" b="0" i="1" smtClean="0">
+                          <a:latin typeface="Cambria Math" panose="02040503050406030204" pitchFamily="18" charset="0"/>
+                        </a:rPr>
+                        <m:t>=</m:t>
+                      </m:r>
+                      <m:sSub>
+                        <m:sSubPr>
+                          <m:ctrlPr>
+                            <a:rPr lang="en-US" i="1">
+                              <a:latin typeface="Cambria Math" panose="02040503050406030204" pitchFamily="18" charset="0"/>
+                              <a:ea typeface="Cambria Math" panose="02040503050406030204" pitchFamily="18" charset="0"/>
+                            </a:rPr>
+                          </m:ctrlPr>
+                        </m:sSubPr>
+                        <m:e>
+                          <m:r>
+                            <a:rPr lang="en-US" i="1">
+                              <a:latin typeface="Cambria Math" panose="02040503050406030204" pitchFamily="18" charset="0"/>
+                              <a:ea typeface="Cambria Math" panose="02040503050406030204" pitchFamily="18" charset="0"/>
+                            </a:rPr>
+                            <m:t>𝛽</m:t>
+                          </m:r>
+                        </m:e>
+                        <m:sub>
+                          <m:r>
+                            <a:rPr lang="en-US" i="1">
+                              <a:latin typeface="Cambria Math" panose="02040503050406030204" pitchFamily="18" charset="0"/>
+                              <a:ea typeface="Cambria Math" panose="02040503050406030204" pitchFamily="18" charset="0"/>
+                            </a:rPr>
+                            <m:t>0</m:t>
+                          </m:r>
+                          <m:r>
+                            <a:rPr lang="en-US" i="1">
+                              <a:latin typeface="Cambria Math" panose="02040503050406030204" pitchFamily="18" charset="0"/>
+                              <a:ea typeface="Cambria Math" panose="02040503050406030204" pitchFamily="18" charset="0"/>
+                            </a:rPr>
+                            <m:t>,</m:t>
+                          </m:r>
+                          <m:r>
+                            <a:rPr lang="en-US" i="1">
+                              <a:latin typeface="Cambria Math" panose="02040503050406030204" pitchFamily="18" charset="0"/>
+                              <a:ea typeface="Cambria Math" panose="02040503050406030204" pitchFamily="18" charset="0"/>
+                            </a:rPr>
+                            <m:t>𝑐</m:t>
+                          </m:r>
+                        </m:sub>
+                      </m:sSub>
+                      <m:r>
+                        <a:rPr lang="en-US" i="1">
+                          <a:latin typeface="Cambria Math" panose="02040503050406030204" pitchFamily="18" charset="0"/>
+                          <a:ea typeface="Cambria Math" panose="02040503050406030204" pitchFamily="18" charset="0"/>
+                        </a:rPr>
+                        <m:t>+</m:t>
+                      </m:r>
+                      <m:sSub>
+                        <m:sSubPr>
+                          <m:ctrlPr>
+                            <a:rPr lang="en-US" i="1">
+                              <a:latin typeface="Cambria Math" panose="02040503050406030204" pitchFamily="18" charset="0"/>
+                              <a:ea typeface="Cambria Math" panose="02040503050406030204" pitchFamily="18" charset="0"/>
+                            </a:rPr>
+                          </m:ctrlPr>
+                        </m:sSubPr>
+                        <m:e>
+                          <m:r>
+                            <a:rPr lang="en-US" i="1">
+                              <a:latin typeface="Cambria Math" panose="02040503050406030204" pitchFamily="18" charset="0"/>
+                              <a:ea typeface="Cambria Math" panose="02040503050406030204" pitchFamily="18" charset="0"/>
+                            </a:rPr>
+                            <m:t>𝛽</m:t>
+                          </m:r>
+                        </m:e>
+                        <m:sub>
+                          <m:r>
+                            <a:rPr lang="en-US" i="1">
+                              <a:latin typeface="Cambria Math" panose="02040503050406030204" pitchFamily="18" charset="0"/>
+                              <a:ea typeface="Cambria Math" panose="02040503050406030204" pitchFamily="18" charset="0"/>
+                            </a:rPr>
+                            <m:t>1</m:t>
+                          </m:r>
+                          <m:r>
+                            <a:rPr lang="en-US" i="1">
+                              <a:latin typeface="Cambria Math" panose="02040503050406030204" pitchFamily="18" charset="0"/>
+                              <a:ea typeface="Cambria Math" panose="02040503050406030204" pitchFamily="18" charset="0"/>
+                            </a:rPr>
+                            <m:t>,</m:t>
+                          </m:r>
+                          <m:r>
+                            <a:rPr lang="en-US" i="1">
+                              <a:latin typeface="Cambria Math" panose="02040503050406030204" pitchFamily="18" charset="0"/>
+                              <a:ea typeface="Cambria Math" panose="02040503050406030204" pitchFamily="18" charset="0"/>
+                            </a:rPr>
+                            <m:t>𝑐</m:t>
+                          </m:r>
+                        </m:sub>
+                      </m:sSub>
+                      <m:sSub>
+                        <m:sSubPr>
+                          <m:ctrlPr>
+                            <a:rPr lang="en-US" i="1">
+                              <a:latin typeface="Cambria Math" panose="02040503050406030204" pitchFamily="18" charset="0"/>
+                              <a:ea typeface="Cambria Math" panose="02040503050406030204" pitchFamily="18" charset="0"/>
+                            </a:rPr>
+                          </m:ctrlPr>
+                        </m:sSubPr>
+                        <m:e>
+                          <m:r>
+                            <a:rPr lang="en-US" i="1">
+                              <a:latin typeface="Cambria Math" panose="02040503050406030204" pitchFamily="18" charset="0"/>
+                              <a:ea typeface="Cambria Math" panose="02040503050406030204" pitchFamily="18" charset="0"/>
+                            </a:rPr>
+                            <m:t>𝑥</m:t>
+                          </m:r>
+                        </m:e>
+                        <m:sub>
+                          <m:r>
+                            <a:rPr lang="en-US" i="1">
+                              <a:latin typeface="Cambria Math" panose="02040503050406030204" pitchFamily="18" charset="0"/>
+                              <a:ea typeface="Cambria Math" panose="02040503050406030204" pitchFamily="18" charset="0"/>
+                            </a:rPr>
+                            <m:t>𝑐</m:t>
+                          </m:r>
+                        </m:sub>
+                      </m:sSub>
+                    </m:oMath>
+                  </m:oMathPara>
+                </a14:m>
+                <a:endParaRPr lang="en-US" dirty="0"/>
+              </a:p>
+              <a:p>
+                <a:pPr lvl="0"/>
+                <a:r>
+                  <a:rPr lang="en-US" dirty="0"/>
+                  <a:t>Binary independent variable,</a:t>
+                </a:r>
+                <a14:m>
+                  <m:oMath xmlns:m="http://schemas.openxmlformats.org/officeDocument/2006/math">
+                    <m:sSub>
+                      <m:sSubPr>
+                        <m:ctrlPr>
+                          <a:rPr lang="en-US" i="1">
+                            <a:latin typeface="Cambria Math" panose="02040503050406030204" pitchFamily="18" charset="0"/>
+                            <a:ea typeface="Cambria Math" panose="02040503050406030204" pitchFamily="18" charset="0"/>
+                          </a:rPr>
+                        </m:ctrlPr>
+                      </m:sSubPr>
+                      <m:e>
+                        <m:r>
+                          <a:rPr lang="en-US" i="1">
+                            <a:latin typeface="Cambria Math" panose="02040503050406030204" pitchFamily="18" charset="0"/>
+                            <a:ea typeface="Cambria Math" panose="02040503050406030204" pitchFamily="18" charset="0"/>
+                          </a:rPr>
+                          <m:t>𝑥</m:t>
+                        </m:r>
+                      </m:e>
+                      <m:sub>
+                        <m:r>
+                          <a:rPr lang="en-US" i="1">
+                            <a:latin typeface="Cambria Math" panose="02040503050406030204" pitchFamily="18" charset="0"/>
+                            <a:ea typeface="Cambria Math" panose="02040503050406030204" pitchFamily="18" charset="0"/>
+                          </a:rPr>
+                          <m:t>𝑐</m:t>
+                        </m:r>
+                      </m:sub>
+                    </m:sSub>
+                  </m:oMath>
+                </a14:m>
+                <a:r>
+                  <a:rPr lang="en-US" dirty="0"/>
+                  <a:t>, the presence of a basement in the house in county </a:t>
+                </a:r>
+                <a14:m>
+                  <m:oMath xmlns:m="http://schemas.openxmlformats.org/officeDocument/2006/math">
+                    <m:r>
+                      <a:rPr lang="en-US" i="1">
+                        <a:latin typeface="Cambria Math" panose="02040503050406030204" pitchFamily="18" charset="0"/>
+                      </a:rPr>
+                      <m:t>𝑐</m:t>
+                    </m:r>
+                  </m:oMath>
+                </a14:m>
+                <a:endParaRPr dirty="0"/>
+              </a:p>
+            </p:txBody>
+          </p:sp>
+        </mc:Choice>
+        <mc:Fallback>
+          <p:sp>
+            <p:nvSpPr>
+              <p:cNvPr id="3" name="Content Placeholder 2">
+                <a:extLst>
+                  <a:ext uri="{FF2B5EF4-FFF2-40B4-BE49-F238E27FC236}">
+                    <a16:creationId xmlns:a16="http://schemas.microsoft.com/office/drawing/2014/main" id="{B170DC6C-EB64-0738-AB85-446DAD53AA28}"/>
+                  </a:ext>
+                </a:extLst>
+              </p:cNvPr>
+              <p:cNvSpPr>
+                <a:spLocks noGrp="1" noRot="1" noChangeAspect="1" noMove="1" noResize="1" noEditPoints="1" noAdjustHandles="1" noChangeArrowheads="1" noChangeShapeType="1" noTextEdit="1"/>
+              </p:cNvSpPr>
+              <p:nvPr>
+                <p:ph idx="1"/>
+              </p:nvPr>
+            </p:nvSpPr>
+            <p:spPr>
+              <a:blipFill>
+                <a:blip r:embed="rId2"/>
+                <a:stretch>
+                  <a:fillRect l="-741" t="-2693"/>
+                </a:stretch>
+              </a:blipFill>
+            </p:spPr>
+            <p:txBody>
+              <a:bodyPr/>
+              <a:lstStyle/>
+              <a:p>
+                <a:r>
+                  <a:rPr lang="en-US">
+                    <a:noFill/>
+                  </a:rPr>
+                  <a:t> </a:t>
+                </a:r>
+              </a:p>
+            </p:txBody>
+          </p:sp>
+        </mc:Fallback>
+      </mc:AlternateContent>
+    </p:spTree>
+    <p:extLst>
+      <p:ext uri="{BB962C8B-B14F-4D97-AF65-F5344CB8AC3E}">
+        <p14:creationId xmlns:p14="http://schemas.microsoft.com/office/powerpoint/2010/main" val="3907609177"/>
+      </p:ext>
+    </p:extLst>
+  </p:cSld>
+  <p:clrMapOvr>
+    <a:masterClrMapping/>
+  </p:clrMapOvr>
+</p:sld>
+</file>
+
+<file path=ppt/slides/slide23.xml><?xml version="1.0" encoding="utf-8"?>
+<p:sld xmlns:a="http://schemas.openxmlformats.org/drawingml/2006/main" xmlns:r="http://schemas.openxmlformats.org/officeDocument/2006/relationships" xmlns:p="http://schemas.openxmlformats.org/presentationml/2006/main">
+  <p:cSld>
+    <p:spTree>
+      <p:nvGrpSpPr>
+        <p:cNvPr id="1" name="">
+          <a:extLst>
+            <a:ext uri="{FF2B5EF4-FFF2-40B4-BE49-F238E27FC236}">
+              <a16:creationId xmlns:a16="http://schemas.microsoft.com/office/drawing/2014/main" id="{2E2EFF6D-046F-7FD8-5F62-E2EA63865FDB}"/>
+            </a:ext>
+          </a:extLst>
+        </p:cNvPr>
+        <p:cNvGrpSpPr/>
+        <p:nvPr/>
+      </p:nvGrpSpPr>
+      <p:grpSpPr>
+        <a:xfrm>
+          <a:off x="0" y="0"/>
+          <a:ext cx="0" cy="0"/>
+          <a:chOff x="0" y="0"/>
+          <a:chExt cx="0" cy="0"/>
+        </a:xfrm>
+      </p:grpSpPr>
+      <p:sp>
+        <p:nvSpPr>
+          <p:cNvPr id="2" name="Title 1">
+            <a:extLst>
+              <a:ext uri="{FF2B5EF4-FFF2-40B4-BE49-F238E27FC236}">
+                <a16:creationId xmlns:a16="http://schemas.microsoft.com/office/drawing/2014/main" id="{A880A3EF-D963-4C38-DBBE-C5F23AA8D704}"/>
+              </a:ext>
+            </a:extLst>
+          </p:cNvPr>
+          <p:cNvSpPr>
+            <a:spLocks noGrp="1"/>
+          </p:cNvSpPr>
+          <p:nvPr>
+            <p:ph type="title"/>
+          </p:nvPr>
+        </p:nvSpPr>
+        <p:spPr>
+          <a:xfrm>
+            <a:off x="457202" y="204787"/>
+            <a:ext cx="4340324" cy="537394"/>
+          </a:xfrm>
+        </p:spPr>
+        <p:txBody>
+          <a:bodyPr>
+            <a:noAutofit/>
+          </a:bodyPr>
+          <a:lstStyle/>
+          <a:p>
+            <a:pPr marL="0" lvl="0" indent="0" algn="ctr">
+              <a:buNone/>
+            </a:pPr>
+            <a:r>
+              <a:rPr sz="3200" b="0" dirty="0"/>
+              <a:t>Pooled Model</a:t>
+            </a:r>
+          </a:p>
+        </p:txBody>
+      </p:sp>
+      <mc:AlternateContent xmlns:mc="http://schemas.openxmlformats.org/markup-compatibility/2006">
+        <mc:Choice xmlns:a14="http://schemas.microsoft.com/office/drawing/2010/main" Requires="a14">
+          <p:sp>
+            <p:nvSpPr>
+              <p:cNvPr id="4" name="Text Placeholder 3">
+                <a:extLst>
+                  <a:ext uri="{FF2B5EF4-FFF2-40B4-BE49-F238E27FC236}">
+                    <a16:creationId xmlns:a16="http://schemas.microsoft.com/office/drawing/2014/main" id="{E260611B-8455-7E66-D7A2-4F42956D8BDA}"/>
+                  </a:ext>
+                </a:extLst>
+              </p:cNvPr>
+              <p:cNvSpPr>
+                <a:spLocks noGrp="1"/>
+              </p:cNvSpPr>
+              <p:nvPr>
+                <p:ph type="body" sz="half" idx="2"/>
+              </p:nvPr>
+            </p:nvSpPr>
+            <p:spPr>
+              <a:xfrm>
+                <a:off x="457202" y="789061"/>
+                <a:ext cx="3470744" cy="4149652"/>
+              </a:xfrm>
+            </p:spPr>
+            <p:txBody>
+              <a:bodyPr>
+                <a:noAutofit/>
+              </a:bodyPr>
+              <a:lstStyle/>
+              <a:p>
+                <a:pPr marL="0" lvl="0" indent="0">
+                  <a:buNone/>
+                </a:pPr>
+                <a:r>
+                  <a:rPr lang="en-US" sz="2000" dirty="0"/>
+                  <a:t>Next we test an </a:t>
+                </a:r>
+                <a:r>
+                  <a:rPr lang="en-US" sz="2000" b="1" dirty="0" err="1"/>
+                  <a:t>unpooled</a:t>
+                </a:r>
+                <a:r>
+                  <a:rPr lang="en-US" sz="2000" b="1" dirty="0"/>
+                  <a:t> model</a:t>
+                </a:r>
+              </a:p>
+              <a:p>
+                <a:pPr marL="342900" lvl="0" indent="-342900">
+                  <a:buFont typeface="Arial" panose="020B0604020202020204" pitchFamily="34" charset="0"/>
+                  <a:buChar char="•"/>
+                </a:pPr>
+                <a:r>
+                  <a:rPr lang="en-US" sz="2000" dirty="0"/>
+                  <a:t>Normal likelihood model:</a:t>
+                </a:r>
+              </a:p>
+              <a:p>
+                <a:pPr lvl="0"/>
+                <a14:m>
+                  <m:oMathPara xmlns:m="http://schemas.openxmlformats.org/officeDocument/2006/math">
+                    <m:oMathParaPr>
+                      <m:jc m:val="centerGroup"/>
+                    </m:oMathParaPr>
+                    <m:oMath xmlns:m="http://schemas.openxmlformats.org/officeDocument/2006/math">
+                      <m:r>
+                        <a:rPr lang="en-US" sz="2000" i="1">
+                          <a:latin typeface="Cambria Math" panose="02040503050406030204" pitchFamily="18" charset="0"/>
+                        </a:rPr>
+                        <m:t>𝑙𝑜𝑔</m:t>
+                      </m:r>
+                      <m:d>
+                        <m:dPr>
+                          <m:ctrlPr>
+                            <a:rPr lang="en-US" sz="2000" i="1">
+                              <a:latin typeface="Cambria Math" panose="02040503050406030204" pitchFamily="18" charset="0"/>
+                            </a:rPr>
+                          </m:ctrlPr>
+                        </m:dPr>
+                        <m:e>
+                          <m:r>
+                            <a:rPr lang="en-US" sz="2000" i="1">
+                              <a:latin typeface="Cambria Math" panose="02040503050406030204" pitchFamily="18" charset="0"/>
+                            </a:rPr>
+                            <m:t>𝑟𝑎𝑑𝑜𝑛</m:t>
+                          </m:r>
+                        </m:e>
+                      </m:d>
+                      <m:r>
+                        <a:rPr lang="en-US" sz="2000" i="1">
+                          <a:latin typeface="Cambria Math" panose="02040503050406030204" pitchFamily="18" charset="0"/>
+                          <a:ea typeface="Cambria Math" panose="02040503050406030204" pitchFamily="18" charset="0"/>
+                        </a:rPr>
+                        <m:t>~</m:t>
+                      </m:r>
+                      <m:r>
+                        <a:rPr lang="en-US" sz="2000" i="1">
+                          <a:latin typeface="Cambria Math" panose="02040503050406030204" pitchFamily="18" charset="0"/>
+                          <a:ea typeface="Cambria Math" panose="02040503050406030204" pitchFamily="18" charset="0"/>
+                        </a:rPr>
+                        <m:t>𝑁</m:t>
+                      </m:r>
+                      <m:d>
+                        <m:dPr>
+                          <m:ctrlPr>
+                            <a:rPr lang="en-US" sz="2000" i="1">
+                              <a:latin typeface="Cambria Math" panose="02040503050406030204" pitchFamily="18" charset="0"/>
+                              <a:ea typeface="Cambria Math" panose="02040503050406030204" pitchFamily="18" charset="0"/>
+                            </a:rPr>
+                          </m:ctrlPr>
+                        </m:dPr>
+                        <m:e>
+                          <m:sSub>
+                            <m:sSubPr>
+                              <m:ctrlPr>
+                                <a:rPr lang="en-US" sz="2000" i="1">
+                                  <a:latin typeface="Cambria Math" panose="02040503050406030204" pitchFamily="18" charset="0"/>
+                                  <a:ea typeface="Cambria Math" panose="02040503050406030204" pitchFamily="18" charset="0"/>
+                                </a:rPr>
+                              </m:ctrlPr>
+                            </m:sSubPr>
+                            <m:e>
+                              <m:r>
+                                <a:rPr lang="en-US" sz="2000" i="1">
+                                  <a:latin typeface="Cambria Math" panose="02040503050406030204" pitchFamily="18" charset="0"/>
+                                  <a:ea typeface="Cambria Math" panose="02040503050406030204" pitchFamily="18" charset="0"/>
+                                </a:rPr>
+                                <m:t>𝜇</m:t>
+                              </m:r>
+                            </m:e>
+                            <m:sub>
+                              <m:r>
+                                <a:rPr lang="en-US" sz="2000" i="1">
+                                  <a:latin typeface="Cambria Math" panose="02040503050406030204" pitchFamily="18" charset="0"/>
+                                  <a:ea typeface="Cambria Math" panose="02040503050406030204" pitchFamily="18" charset="0"/>
+                                </a:rPr>
+                                <m:t>𝑐</m:t>
+                              </m:r>
+                            </m:sub>
+                          </m:sSub>
+                          <m:r>
+                            <a:rPr lang="en-US" sz="2000" i="1">
+                              <a:latin typeface="Cambria Math" panose="02040503050406030204" pitchFamily="18" charset="0"/>
+                              <a:ea typeface="Cambria Math" panose="02040503050406030204" pitchFamily="18" charset="0"/>
+                            </a:rPr>
+                            <m:t>,</m:t>
+                          </m:r>
+                          <m:r>
+                            <a:rPr lang="en-US" sz="2000" i="1">
+                              <a:latin typeface="Cambria Math" panose="02040503050406030204" pitchFamily="18" charset="0"/>
+                              <a:ea typeface="Cambria Math" panose="02040503050406030204" pitchFamily="18" charset="0"/>
+                            </a:rPr>
+                            <m:t>𝜀</m:t>
+                          </m:r>
+                        </m:e>
+                      </m:d>
+                    </m:oMath>
+                  </m:oMathPara>
+                </a14:m>
+                <a:endParaRPr lang="en-US" sz="2000" dirty="0"/>
+              </a:p>
+              <a:p>
+                <a:pPr/>
+                <a14:m>
+                  <m:oMathPara xmlns:m="http://schemas.openxmlformats.org/officeDocument/2006/math">
+                    <m:oMathParaPr>
+                      <m:jc m:val="centerGroup"/>
+                    </m:oMathParaPr>
+                    <m:oMath xmlns:m="http://schemas.openxmlformats.org/officeDocument/2006/math">
+                      <m:sSub>
+                        <m:sSubPr>
+                          <m:ctrlPr>
+                            <a:rPr lang="en-US" sz="2000" i="1">
+                              <a:latin typeface="Cambria Math" panose="02040503050406030204" pitchFamily="18" charset="0"/>
+                              <a:ea typeface="Cambria Math" panose="02040503050406030204" pitchFamily="18" charset="0"/>
+                            </a:rPr>
+                          </m:ctrlPr>
+                        </m:sSubPr>
+                        <m:e>
+                          <m:r>
+                            <a:rPr lang="en-US" sz="2000" i="1">
+                              <a:latin typeface="Cambria Math" panose="02040503050406030204" pitchFamily="18" charset="0"/>
+                              <a:ea typeface="Cambria Math" panose="02040503050406030204" pitchFamily="18" charset="0"/>
+                            </a:rPr>
+                            <m:t>𝜇</m:t>
+                          </m:r>
+                        </m:e>
+                        <m:sub>
+                          <m:r>
+                            <a:rPr lang="en-US" sz="2000" i="1">
+                              <a:latin typeface="Cambria Math" panose="02040503050406030204" pitchFamily="18" charset="0"/>
+                              <a:ea typeface="Cambria Math" panose="02040503050406030204" pitchFamily="18" charset="0"/>
+                            </a:rPr>
+                            <m:t>𝑐</m:t>
+                          </m:r>
+                        </m:sub>
+                      </m:sSub>
+                      <m:r>
+                        <a:rPr lang="en-US" sz="2000" i="1">
+                          <a:latin typeface="Cambria Math" panose="02040503050406030204" pitchFamily="18" charset="0"/>
+                          <a:ea typeface="Cambria Math" panose="02040503050406030204" pitchFamily="18" charset="0"/>
+                        </a:rPr>
+                        <m:t>=</m:t>
+                      </m:r>
+                      <m:sSub>
+                        <m:sSubPr>
+                          <m:ctrlPr>
+                            <a:rPr lang="en-US" sz="2000" i="1">
+                              <a:latin typeface="Cambria Math" panose="02040503050406030204" pitchFamily="18" charset="0"/>
+                              <a:ea typeface="Cambria Math" panose="02040503050406030204" pitchFamily="18" charset="0"/>
+                            </a:rPr>
+                          </m:ctrlPr>
+                        </m:sSubPr>
+                        <m:e>
+                          <m:r>
+                            <a:rPr lang="en-US" sz="2000" i="1">
+                              <a:latin typeface="Cambria Math" panose="02040503050406030204" pitchFamily="18" charset="0"/>
+                              <a:ea typeface="Cambria Math" panose="02040503050406030204" pitchFamily="18" charset="0"/>
+                            </a:rPr>
+                            <m:t>𝛽</m:t>
+                          </m:r>
+                        </m:e>
+                        <m:sub>
+                          <m:r>
+                            <a:rPr lang="en-US" sz="2000" i="1">
+                              <a:latin typeface="Cambria Math" panose="02040503050406030204" pitchFamily="18" charset="0"/>
+                              <a:ea typeface="Cambria Math" panose="02040503050406030204" pitchFamily="18" charset="0"/>
+                            </a:rPr>
+                            <m:t>0</m:t>
+                          </m:r>
+                          <m:r>
+                            <a:rPr lang="en-US" sz="2000" i="1">
+                              <a:latin typeface="Cambria Math" panose="02040503050406030204" pitchFamily="18" charset="0"/>
+                              <a:ea typeface="Cambria Math" panose="02040503050406030204" pitchFamily="18" charset="0"/>
+                            </a:rPr>
+                            <m:t>,</m:t>
+                          </m:r>
+                          <m:r>
+                            <a:rPr lang="en-US" sz="2000" i="1">
+                              <a:latin typeface="Cambria Math" panose="02040503050406030204" pitchFamily="18" charset="0"/>
+                              <a:ea typeface="Cambria Math" panose="02040503050406030204" pitchFamily="18" charset="0"/>
+                            </a:rPr>
+                            <m:t>𝑐</m:t>
+                          </m:r>
+                        </m:sub>
+                      </m:sSub>
+                      <m:r>
+                        <a:rPr lang="en-US" sz="2000" i="1">
+                          <a:latin typeface="Cambria Math" panose="02040503050406030204" pitchFamily="18" charset="0"/>
+                          <a:ea typeface="Cambria Math" panose="02040503050406030204" pitchFamily="18" charset="0"/>
+                        </a:rPr>
+                        <m:t>+</m:t>
+                      </m:r>
+                      <m:sSub>
+                        <m:sSubPr>
+                          <m:ctrlPr>
+                            <a:rPr lang="en-US" sz="2000" i="1">
+                              <a:latin typeface="Cambria Math" panose="02040503050406030204" pitchFamily="18" charset="0"/>
+                              <a:ea typeface="Cambria Math" panose="02040503050406030204" pitchFamily="18" charset="0"/>
+                            </a:rPr>
+                          </m:ctrlPr>
+                        </m:sSubPr>
+                        <m:e>
+                          <m:r>
+                            <a:rPr lang="en-US" sz="2000" i="1">
+                              <a:latin typeface="Cambria Math" panose="02040503050406030204" pitchFamily="18" charset="0"/>
+                              <a:ea typeface="Cambria Math" panose="02040503050406030204" pitchFamily="18" charset="0"/>
+                            </a:rPr>
+                            <m:t>𝛽</m:t>
+                          </m:r>
+                        </m:e>
+                        <m:sub>
+                          <m:r>
+                            <a:rPr lang="en-US" sz="2000" i="1">
+                              <a:latin typeface="Cambria Math" panose="02040503050406030204" pitchFamily="18" charset="0"/>
+                              <a:ea typeface="Cambria Math" panose="02040503050406030204" pitchFamily="18" charset="0"/>
+                            </a:rPr>
+                            <m:t>1</m:t>
+                          </m:r>
+                          <m:r>
+                            <a:rPr lang="en-US" sz="2000" i="1">
+                              <a:latin typeface="Cambria Math" panose="02040503050406030204" pitchFamily="18" charset="0"/>
+                              <a:ea typeface="Cambria Math" panose="02040503050406030204" pitchFamily="18" charset="0"/>
+                            </a:rPr>
+                            <m:t>,</m:t>
+                          </m:r>
+                          <m:r>
+                            <a:rPr lang="en-US" sz="2000" i="1">
+                              <a:latin typeface="Cambria Math" panose="02040503050406030204" pitchFamily="18" charset="0"/>
+                              <a:ea typeface="Cambria Math" panose="02040503050406030204" pitchFamily="18" charset="0"/>
+                            </a:rPr>
+                            <m:t>𝑐</m:t>
+                          </m:r>
+                        </m:sub>
+                      </m:sSub>
+                      <m:sSub>
+                        <m:sSubPr>
+                          <m:ctrlPr>
+                            <a:rPr lang="en-US" sz="2000" i="1">
+                              <a:latin typeface="Cambria Math" panose="02040503050406030204" pitchFamily="18" charset="0"/>
+                              <a:ea typeface="Cambria Math" panose="02040503050406030204" pitchFamily="18" charset="0"/>
+                            </a:rPr>
+                          </m:ctrlPr>
+                        </m:sSubPr>
+                        <m:e>
+                          <m:r>
+                            <a:rPr lang="en-US" sz="2000" i="1">
+                              <a:latin typeface="Cambria Math" panose="02040503050406030204" pitchFamily="18" charset="0"/>
+                              <a:ea typeface="Cambria Math" panose="02040503050406030204" pitchFamily="18" charset="0"/>
+                            </a:rPr>
+                            <m:t>𝑥</m:t>
+                          </m:r>
+                        </m:e>
+                        <m:sub>
+                          <m:r>
+                            <a:rPr lang="en-US" sz="2000" i="1">
+                              <a:latin typeface="Cambria Math" panose="02040503050406030204" pitchFamily="18" charset="0"/>
+                              <a:ea typeface="Cambria Math" panose="02040503050406030204" pitchFamily="18" charset="0"/>
+                            </a:rPr>
+                            <m:t>𝑐</m:t>
+                          </m:r>
+                        </m:sub>
+                      </m:sSub>
+                    </m:oMath>
+                  </m:oMathPara>
+                </a14:m>
+                <a:endParaRPr lang="en-US" sz="2000" dirty="0"/>
+              </a:p>
+              <a:p>
+                <a:pPr marL="342900" lvl="0" indent="-342900">
+                  <a:buFont typeface="Arial" panose="020B0604020202020204" pitchFamily="34" charset="0"/>
+                  <a:buChar char="•"/>
+                </a:pPr>
+                <a:r>
+                  <a:rPr lang="en-US" sz="2000" dirty="0"/>
+                  <a:t>The model has county specific parameters parameters </a:t>
+                </a:r>
+                <a14:m>
+                  <m:oMath xmlns:m="http://schemas.openxmlformats.org/officeDocument/2006/math">
+                    <m:d>
+                      <m:dPr>
+                        <m:begChr m:val="["/>
+                        <m:endChr m:val="]"/>
+                        <m:ctrlPr>
+                          <a:rPr lang="ar-AE" sz="2000" i="1">
+                            <a:latin typeface="Cambria Math" panose="02040503050406030204" pitchFamily="18" charset="0"/>
+                          </a:rPr>
+                        </m:ctrlPr>
+                      </m:dPr>
+                      <m:e>
+                        <m:sSub>
+                          <m:sSubPr>
+                            <m:ctrlPr>
+                              <a:rPr lang="en-US" sz="2000" i="1">
+                                <a:latin typeface="Cambria Math" panose="02040503050406030204" pitchFamily="18" charset="0"/>
+                                <a:ea typeface="Cambria Math" panose="02040503050406030204" pitchFamily="18" charset="0"/>
+                              </a:rPr>
+                            </m:ctrlPr>
+                          </m:sSubPr>
+                          <m:e>
+                            <m:r>
+                              <a:rPr lang="en-US" sz="2000" i="1">
+                                <a:latin typeface="Cambria Math" panose="02040503050406030204" pitchFamily="18" charset="0"/>
+                                <a:ea typeface="Cambria Math" panose="02040503050406030204" pitchFamily="18" charset="0"/>
+                              </a:rPr>
+                              <m:t>𝛽</m:t>
+                            </m:r>
+                          </m:e>
+                          <m:sub>
+                            <m:r>
+                              <a:rPr lang="en-US" sz="2000" i="1">
+                                <a:latin typeface="Cambria Math" panose="02040503050406030204" pitchFamily="18" charset="0"/>
+                                <a:ea typeface="Cambria Math" panose="02040503050406030204" pitchFamily="18" charset="0"/>
+                              </a:rPr>
+                              <m:t>0</m:t>
+                            </m:r>
+                            <m:r>
+                              <a:rPr lang="en-US" sz="2000" b="0" i="1" smtClean="0">
+                                <a:latin typeface="Cambria Math" panose="02040503050406030204" pitchFamily="18" charset="0"/>
+                                <a:ea typeface="Cambria Math" panose="02040503050406030204" pitchFamily="18" charset="0"/>
+                              </a:rPr>
+                              <m:t>,</m:t>
+                            </m:r>
+                            <m:r>
+                              <a:rPr lang="en-US" sz="2000" b="0" i="1" smtClean="0">
+                                <a:latin typeface="Cambria Math" panose="02040503050406030204" pitchFamily="18" charset="0"/>
+                                <a:ea typeface="Cambria Math" panose="02040503050406030204" pitchFamily="18" charset="0"/>
+                              </a:rPr>
+                              <m:t>𝑐</m:t>
+                            </m:r>
+                          </m:sub>
+                        </m:sSub>
+                        <m:sSub>
+                          <m:sSubPr>
+                            <m:ctrlPr>
+                              <a:rPr lang="en-US" sz="2000" i="1">
+                                <a:latin typeface="Cambria Math" panose="02040503050406030204" pitchFamily="18" charset="0"/>
+                                <a:ea typeface="Cambria Math" panose="02040503050406030204" pitchFamily="18" charset="0"/>
+                              </a:rPr>
+                            </m:ctrlPr>
+                          </m:sSubPr>
+                          <m:e>
+                            <m:r>
+                              <a:rPr lang="en-US" sz="2000" i="1">
+                                <a:latin typeface="Cambria Math" panose="02040503050406030204" pitchFamily="18" charset="0"/>
+                                <a:ea typeface="Cambria Math" panose="02040503050406030204" pitchFamily="18" charset="0"/>
+                              </a:rPr>
+                              <m:t>,</m:t>
+                            </m:r>
+                            <m:r>
+                              <a:rPr lang="en-US" sz="2000" i="1">
+                                <a:latin typeface="Cambria Math" panose="02040503050406030204" pitchFamily="18" charset="0"/>
+                                <a:ea typeface="Cambria Math" panose="02040503050406030204" pitchFamily="18" charset="0"/>
+                              </a:rPr>
+                              <m:t>𝛽</m:t>
+                            </m:r>
+                          </m:e>
+                          <m:sub>
+                            <m:r>
+                              <a:rPr lang="en-US" sz="2000" i="1">
+                                <a:latin typeface="Cambria Math" panose="02040503050406030204" pitchFamily="18" charset="0"/>
+                                <a:ea typeface="Cambria Math" panose="02040503050406030204" pitchFamily="18" charset="0"/>
+                              </a:rPr>
+                              <m:t>1</m:t>
+                            </m:r>
+                            <m:r>
+                              <a:rPr lang="en-US" sz="2000" b="0" i="1" smtClean="0">
+                                <a:latin typeface="Cambria Math" panose="02040503050406030204" pitchFamily="18" charset="0"/>
+                                <a:ea typeface="Cambria Math" panose="02040503050406030204" pitchFamily="18" charset="0"/>
+                              </a:rPr>
+                              <m:t>,</m:t>
+                            </m:r>
+                            <m:r>
+                              <a:rPr lang="en-US" sz="2000" b="0" i="1" smtClean="0">
+                                <a:latin typeface="Cambria Math" panose="02040503050406030204" pitchFamily="18" charset="0"/>
+                                <a:ea typeface="Cambria Math" panose="02040503050406030204" pitchFamily="18" charset="0"/>
+                              </a:rPr>
+                              <m:t>𝑐</m:t>
+                            </m:r>
+                          </m:sub>
+                        </m:sSub>
+                        <m:r>
+                          <a:rPr lang="ar-AE" sz="2000">
+                            <a:latin typeface="Cambria Math" panose="02040503050406030204" pitchFamily="18" charset="0"/>
+                          </a:rPr>
+                          <m:t>,</m:t>
+                        </m:r>
+                        <m:r>
+                          <a:rPr lang="en-US" sz="2000" i="1">
+                            <a:latin typeface="Cambria Math" panose="02040503050406030204" pitchFamily="18" charset="0"/>
+                            <a:ea typeface="Cambria Math" panose="02040503050406030204" pitchFamily="18" charset="0"/>
+                          </a:rPr>
+                          <m:t>𝜀</m:t>
+                        </m:r>
+                      </m:e>
+                    </m:d>
+                  </m:oMath>
+                </a14:m>
+                <a:endParaRPr lang="ar-AE" sz="2000" dirty="0"/>
+              </a:p>
+              <a:p>
+                <a:pPr marL="342900" lvl="0" indent="-342900">
+                  <a:buFont typeface="Arial" panose="020B0604020202020204" pitchFamily="34" charset="0"/>
+                  <a:buChar char="•"/>
+                </a:pPr>
+                <a:r>
+                  <a:rPr lang="en-US" sz="2000" dirty="0"/>
+                  <a:t>County specific prior distribution of the parameters:</a:t>
+                </a:r>
+              </a:p>
+              <a:p>
+                <a:pPr lvl="0"/>
+                <a14:m>
+                  <m:oMathPara xmlns:m="http://schemas.openxmlformats.org/officeDocument/2006/math">
+                    <m:oMathParaPr>
+                      <m:jc m:val="centerGroup"/>
+                    </m:oMathParaPr>
+                    <m:oMath xmlns:m="http://schemas.openxmlformats.org/officeDocument/2006/math">
+                      <m:sSub>
+                        <m:sSubPr>
+                          <m:ctrlPr>
+                            <a:rPr lang="en-US" sz="2000" i="1">
+                              <a:latin typeface="Cambria Math" panose="02040503050406030204" pitchFamily="18" charset="0"/>
+                              <a:ea typeface="Cambria Math" panose="02040503050406030204" pitchFamily="18" charset="0"/>
+                            </a:rPr>
+                          </m:ctrlPr>
+                        </m:sSubPr>
+                        <m:e>
+                          <m:r>
+                            <a:rPr lang="en-US" sz="2000" i="1">
+                              <a:latin typeface="Cambria Math" panose="02040503050406030204" pitchFamily="18" charset="0"/>
+                              <a:ea typeface="Cambria Math" panose="02040503050406030204" pitchFamily="18" charset="0"/>
+                            </a:rPr>
+                            <m:t>𝛽</m:t>
+                          </m:r>
+                        </m:e>
+                        <m:sub>
+                          <m:r>
+                            <a:rPr lang="en-US" sz="2000" i="1">
+                              <a:latin typeface="Cambria Math" panose="02040503050406030204" pitchFamily="18" charset="0"/>
+                              <a:ea typeface="Cambria Math" panose="02040503050406030204" pitchFamily="18" charset="0"/>
+                            </a:rPr>
+                            <m:t>0</m:t>
+                          </m:r>
+                          <m:r>
+                            <a:rPr lang="en-US" sz="2000" b="0" i="1" smtClean="0">
+                              <a:latin typeface="Cambria Math" panose="02040503050406030204" pitchFamily="18" charset="0"/>
+                              <a:ea typeface="Cambria Math" panose="02040503050406030204" pitchFamily="18" charset="0"/>
+                            </a:rPr>
+                            <m:t>,</m:t>
+                          </m:r>
+                          <m:r>
+                            <a:rPr lang="en-US" sz="2000" b="0" i="1" smtClean="0">
+                              <a:latin typeface="Cambria Math" panose="02040503050406030204" pitchFamily="18" charset="0"/>
+                              <a:ea typeface="Cambria Math" panose="02040503050406030204" pitchFamily="18" charset="0"/>
+                            </a:rPr>
+                            <m:t>𝑐</m:t>
+                          </m:r>
+                        </m:sub>
+                      </m:sSub>
+                      <m:sSub>
+                        <m:sSubPr>
+                          <m:ctrlPr>
+                            <a:rPr lang="en-US" sz="2000" i="1">
+                              <a:latin typeface="Cambria Math" panose="02040503050406030204" pitchFamily="18" charset="0"/>
+                              <a:ea typeface="Cambria Math" panose="02040503050406030204" pitchFamily="18" charset="0"/>
+                            </a:rPr>
+                          </m:ctrlPr>
+                        </m:sSubPr>
+                        <m:e>
+                          <m:r>
+                            <a:rPr lang="en-US" sz="2000" i="1">
+                              <a:latin typeface="Cambria Math" panose="02040503050406030204" pitchFamily="18" charset="0"/>
+                              <a:ea typeface="Cambria Math" panose="02040503050406030204" pitchFamily="18" charset="0"/>
+                            </a:rPr>
+                            <m:t>,</m:t>
+                          </m:r>
+                          <m:r>
+                            <a:rPr lang="en-US" sz="2000" i="1">
+                              <a:latin typeface="Cambria Math" panose="02040503050406030204" pitchFamily="18" charset="0"/>
+                              <a:ea typeface="Cambria Math" panose="02040503050406030204" pitchFamily="18" charset="0"/>
+                            </a:rPr>
+                            <m:t>𝛽</m:t>
+                          </m:r>
+                        </m:e>
+                        <m:sub>
+                          <m:r>
+                            <a:rPr lang="en-US" sz="2000" i="1">
+                              <a:latin typeface="Cambria Math" panose="02040503050406030204" pitchFamily="18" charset="0"/>
+                              <a:ea typeface="Cambria Math" panose="02040503050406030204" pitchFamily="18" charset="0"/>
+                            </a:rPr>
+                            <m:t>1</m:t>
+                          </m:r>
+                          <m:r>
+                            <a:rPr lang="en-US" sz="2000" b="0" i="1" smtClean="0">
+                              <a:latin typeface="Cambria Math" panose="02040503050406030204" pitchFamily="18" charset="0"/>
+                              <a:ea typeface="Cambria Math" panose="02040503050406030204" pitchFamily="18" charset="0"/>
+                            </a:rPr>
+                            <m:t>,</m:t>
+                          </m:r>
+                          <m:r>
+                            <a:rPr lang="en-US" sz="2000" b="0" i="1" smtClean="0">
+                              <a:latin typeface="Cambria Math" panose="02040503050406030204" pitchFamily="18" charset="0"/>
+                              <a:ea typeface="Cambria Math" panose="02040503050406030204" pitchFamily="18" charset="0"/>
+                            </a:rPr>
+                            <m:t>𝑐</m:t>
+                          </m:r>
+                        </m:sub>
+                      </m:sSub>
+                      <m:r>
+                        <a:rPr lang="en-US" sz="2000" i="1" smtClean="0">
+                          <a:latin typeface="Cambria Math" panose="02040503050406030204" pitchFamily="18" charset="0"/>
+                          <a:ea typeface="Cambria Math" panose="02040503050406030204" pitchFamily="18" charset="0"/>
+                        </a:rPr>
+                        <m:t>~</m:t>
+                      </m:r>
+                      <m:r>
+                        <a:rPr lang="en-US" sz="2000" b="0" i="1" smtClean="0">
+                          <a:latin typeface="Cambria Math" panose="02040503050406030204" pitchFamily="18" charset="0"/>
+                          <a:ea typeface="Cambria Math" panose="02040503050406030204" pitchFamily="18" charset="0"/>
+                        </a:rPr>
+                        <m:t>𝑁</m:t>
+                      </m:r>
+                      <m:d>
+                        <m:dPr>
+                          <m:ctrlPr>
+                            <a:rPr lang="en-US" sz="2000" b="0" i="1" smtClean="0">
+                              <a:latin typeface="Cambria Math" panose="02040503050406030204" pitchFamily="18" charset="0"/>
+                              <a:ea typeface="Cambria Math" panose="02040503050406030204" pitchFamily="18" charset="0"/>
+                            </a:rPr>
+                          </m:ctrlPr>
+                        </m:dPr>
+                        <m:e>
+                          <m:r>
+                            <a:rPr lang="en-US" sz="2000" b="0" i="1" smtClean="0">
+                              <a:latin typeface="Cambria Math" panose="02040503050406030204" pitchFamily="18" charset="0"/>
+                              <a:ea typeface="Cambria Math" panose="02040503050406030204" pitchFamily="18" charset="0"/>
+                            </a:rPr>
+                            <m:t>0</m:t>
+                          </m:r>
+                          <m:r>
+                            <a:rPr lang="en-US" sz="2000" b="0" i="1" smtClean="0">
+                              <a:latin typeface="Cambria Math" panose="02040503050406030204" pitchFamily="18" charset="0"/>
+                              <a:ea typeface="Cambria Math" panose="02040503050406030204" pitchFamily="18" charset="0"/>
+                            </a:rPr>
+                            <m:t>,</m:t>
+                          </m:r>
+                          <m:r>
+                            <a:rPr lang="en-US" sz="2000" b="0" i="1" smtClean="0">
+                              <a:latin typeface="Cambria Math" panose="02040503050406030204" pitchFamily="18" charset="0"/>
+                              <a:ea typeface="Cambria Math" panose="02040503050406030204" pitchFamily="18" charset="0"/>
+                            </a:rPr>
+                            <m:t>𝜎</m:t>
+                          </m:r>
+                        </m:e>
+                      </m:d>
+                    </m:oMath>
+                  </m:oMathPara>
+                </a14:m>
+                <a:endParaRPr lang="en-US" sz="2000" dirty="0"/>
+              </a:p>
+              <a:p>
+                <a:pPr lvl="0"/>
+                <a14:m>
+                  <m:oMathPara xmlns:m="http://schemas.openxmlformats.org/officeDocument/2006/math">
+                    <m:oMathParaPr>
+                      <m:jc m:val="centerGroup"/>
+                    </m:oMathParaPr>
+                    <m:oMath xmlns:m="http://schemas.openxmlformats.org/officeDocument/2006/math">
+                      <m:r>
+                        <a:rPr lang="en-US" sz="2000" i="1" smtClean="0">
+                          <a:latin typeface="Cambria Math" panose="02040503050406030204" pitchFamily="18" charset="0"/>
+                          <a:ea typeface="Cambria Math" panose="02040503050406030204" pitchFamily="18" charset="0"/>
+                        </a:rPr>
+                        <m:t>𝜀</m:t>
+                      </m:r>
+                      <m:r>
+                        <a:rPr lang="en-US" sz="2000" i="1" smtClean="0">
+                          <a:latin typeface="Cambria Math" panose="02040503050406030204" pitchFamily="18" charset="0"/>
+                          <a:ea typeface="Cambria Math" panose="02040503050406030204" pitchFamily="18" charset="0"/>
+                        </a:rPr>
+                        <m:t>~|</m:t>
+                      </m:r>
+                      <m:r>
+                        <a:rPr lang="en-US" sz="2000" b="0" i="1" smtClean="0">
+                          <a:latin typeface="Cambria Math" panose="02040503050406030204" pitchFamily="18" charset="0"/>
+                          <a:ea typeface="Cambria Math" panose="02040503050406030204" pitchFamily="18" charset="0"/>
+                        </a:rPr>
+                        <m:t>𝐶𝑎𝑢𝑐</m:t>
+                      </m:r>
+                      <m:r>
+                        <a:rPr lang="en-US" sz="2000" b="0" i="1" smtClean="0">
+                          <a:latin typeface="Cambria Math" panose="02040503050406030204" pitchFamily="18" charset="0"/>
+                          <a:ea typeface="Cambria Math" panose="02040503050406030204" pitchFamily="18" charset="0"/>
+                        </a:rPr>
+                        <m:t>h</m:t>
+                      </m:r>
+                      <m:r>
+                        <a:rPr lang="en-US" sz="2000" b="0" i="1" smtClean="0">
+                          <a:latin typeface="Cambria Math" panose="02040503050406030204" pitchFamily="18" charset="0"/>
+                          <a:ea typeface="Cambria Math" panose="02040503050406030204" pitchFamily="18" charset="0"/>
+                        </a:rPr>
+                        <m:t>𝑦</m:t>
+                      </m:r>
+                      <m:d>
+                        <m:dPr>
+                          <m:ctrlPr>
+                            <a:rPr lang="en-US" sz="2000" b="0" i="1" smtClean="0">
+                              <a:latin typeface="Cambria Math" panose="02040503050406030204" pitchFamily="18" charset="0"/>
+                              <a:ea typeface="Cambria Math" panose="02040503050406030204" pitchFamily="18" charset="0"/>
+                            </a:rPr>
+                          </m:ctrlPr>
+                        </m:dPr>
+                        <m:e>
+                          <m:r>
+                            <a:rPr lang="en-US" sz="2000">
+                              <a:latin typeface="Cambria Math" panose="02040503050406030204" pitchFamily="18" charset="0"/>
+                            </a:rPr>
+                            <m:t>𝜂</m:t>
+                          </m:r>
+                        </m:e>
+                      </m:d>
+                    </m:oMath>
+                  </m:oMathPara>
+                </a14:m>
+                <a:endParaRPr lang="en-US" sz="2000" dirty="0"/>
+              </a:p>
+            </p:txBody>
+          </p:sp>
+        </mc:Choice>
+        <mc:Fallback>
+          <p:sp>
+            <p:nvSpPr>
+              <p:cNvPr id="4" name="Text Placeholder 3">
+                <a:extLst>
+                  <a:ext uri="{FF2B5EF4-FFF2-40B4-BE49-F238E27FC236}">
+                    <a16:creationId xmlns:a16="http://schemas.microsoft.com/office/drawing/2014/main" id="{E260611B-8455-7E66-D7A2-4F42956D8BDA}"/>
+                  </a:ext>
+                </a:extLst>
+              </p:cNvPr>
+              <p:cNvSpPr>
+                <a:spLocks noGrp="1" noRot="1" noChangeAspect="1" noMove="1" noResize="1" noEditPoints="1" noAdjustHandles="1" noChangeArrowheads="1" noChangeShapeType="1" noTextEdit="1"/>
+              </p:cNvSpPr>
+              <p:nvPr>
+                <p:ph type="body" sz="half" idx="2"/>
+              </p:nvPr>
+            </p:nvSpPr>
+            <p:spPr>
+              <a:xfrm>
+                <a:off x="457202" y="789061"/>
+                <a:ext cx="3470744" cy="4149652"/>
+              </a:xfrm>
+              <a:blipFill>
+                <a:blip r:embed="rId2"/>
+                <a:stretch>
+                  <a:fillRect l="-1757" t="-734" b="-5140"/>
+                </a:stretch>
+              </a:blipFill>
+            </p:spPr>
+            <p:txBody>
+              <a:bodyPr/>
+              <a:lstStyle/>
+              <a:p>
+                <a:r>
+                  <a:rPr lang="en-US">
+                    <a:noFill/>
+                  </a:rPr>
+                  <a:t> </a:t>
+                </a:r>
+              </a:p>
+            </p:txBody>
+          </p:sp>
+        </mc:Fallback>
+      </mc:AlternateContent>
+      <p:pic>
+        <p:nvPicPr>
+          <p:cNvPr id="5" name="Picture 4">
+            <a:extLst>
+              <a:ext uri="{FF2B5EF4-FFF2-40B4-BE49-F238E27FC236}">
+                <a16:creationId xmlns:a16="http://schemas.microsoft.com/office/drawing/2014/main" id="{6A03BE46-3C91-0D00-DA90-1630DCD62395}"/>
+              </a:ext>
+            </a:extLst>
+          </p:cNvPr>
+          <p:cNvPicPr>
+            <a:picLocks noChangeAspect="1"/>
+          </p:cNvPicPr>
+          <p:nvPr/>
+        </p:nvPicPr>
+        <p:blipFill>
+          <a:blip r:embed="rId3"/>
+          <a:stretch>
+            <a:fillRect/>
+          </a:stretch>
+        </p:blipFill>
+        <p:spPr>
+          <a:xfrm>
+            <a:off x="3927946" y="2122170"/>
+            <a:ext cx="5185574" cy="1998471"/>
+          </a:xfrm>
+          <a:prstGeom prst="rect">
+            <a:avLst/>
+          </a:prstGeom>
+        </p:spPr>
+      </p:pic>
+    </p:spTree>
+    <p:extLst>
+      <p:ext uri="{BB962C8B-B14F-4D97-AF65-F5344CB8AC3E}">
+        <p14:creationId xmlns:p14="http://schemas.microsoft.com/office/powerpoint/2010/main" val="3229822989"/>
+      </p:ext>
+    </p:extLst>
+  </p:cSld>
+  <p:clrMapOvr>
+    <a:masterClrMapping/>
+  </p:clrMapOvr>
+</p:sld>
+</file>
+
+<file path=ppt/slides/slide24.xml><?xml version="1.0" encoding="utf-8"?>
+<p:sld xmlns:a="http://schemas.openxmlformats.org/drawingml/2006/main" xmlns:r="http://schemas.openxmlformats.org/officeDocument/2006/relationships" xmlns:p="http://schemas.openxmlformats.org/presentationml/2006/main">
+  <p:cSld>
+    <p:spTree>
+      <p:nvGrpSpPr>
+        <p:cNvPr id="1" name="">
+          <a:extLst>
+            <a:ext uri="{FF2B5EF4-FFF2-40B4-BE49-F238E27FC236}">
+              <a16:creationId xmlns:a16="http://schemas.microsoft.com/office/drawing/2014/main" id="{7D2FBBD9-767F-BD9D-7E0D-FBCA30E7C70F}"/>
+            </a:ext>
+          </a:extLst>
+        </p:cNvPr>
+        <p:cNvGrpSpPr/>
+        <p:nvPr/>
+      </p:nvGrpSpPr>
+      <p:grpSpPr>
+        <a:xfrm>
+          <a:off x="0" y="0"/>
+          <a:ext cx="0" cy="0"/>
+          <a:chOff x="0" y="0"/>
+          <a:chExt cx="0" cy="0"/>
+        </a:xfrm>
+      </p:grpSpPr>
+      <p:sp>
+        <p:nvSpPr>
+          <p:cNvPr id="2" name="Title 1">
+            <a:extLst>
+              <a:ext uri="{FF2B5EF4-FFF2-40B4-BE49-F238E27FC236}">
+                <a16:creationId xmlns:a16="http://schemas.microsoft.com/office/drawing/2014/main" id="{806FC60E-C63A-9EDC-B069-60C911B61129}"/>
+              </a:ext>
+            </a:extLst>
+          </p:cNvPr>
+          <p:cNvSpPr>
+            <a:spLocks noGrp="1"/>
+          </p:cNvSpPr>
+          <p:nvPr>
+            <p:ph type="title"/>
+          </p:nvPr>
+        </p:nvSpPr>
+        <p:spPr>
+          <a:xfrm>
+            <a:off x="430530" y="64770"/>
+            <a:ext cx="8229600" cy="476011"/>
+          </a:xfrm>
+        </p:spPr>
+        <p:txBody>
+          <a:bodyPr>
+            <a:normAutofit fontScale="90000"/>
+          </a:bodyPr>
+          <a:lstStyle/>
+          <a:p>
+            <a:pPr marL="0" lvl="0" indent="0">
+              <a:buNone/>
+            </a:pPr>
+            <a:r>
+              <a:rPr dirty="0"/>
+              <a:t>Defining and Sampling the </a:t>
+            </a:r>
+            <a:r>
+              <a:rPr lang="en-US" dirty="0" err="1"/>
+              <a:t>Unp</a:t>
+            </a:r>
+            <a:r>
+              <a:rPr dirty="0" err="1"/>
+              <a:t>ooled</a:t>
+            </a:r>
+            <a:r>
+              <a:rPr dirty="0"/>
+              <a:t> Model</a:t>
+            </a:r>
+          </a:p>
+        </p:txBody>
+      </p:sp>
+      <p:sp>
+        <p:nvSpPr>
+          <p:cNvPr id="3" name="Content Placeholder 2">
+            <a:extLst>
+              <a:ext uri="{FF2B5EF4-FFF2-40B4-BE49-F238E27FC236}">
+                <a16:creationId xmlns:a16="http://schemas.microsoft.com/office/drawing/2014/main" id="{DD1671B8-F8FD-25B1-C782-70AB92D27E42}"/>
+              </a:ext>
+            </a:extLst>
+          </p:cNvPr>
+          <p:cNvSpPr>
+            <a:spLocks noGrp="1"/>
+          </p:cNvSpPr>
+          <p:nvPr>
+            <p:ph idx="1"/>
+          </p:nvPr>
+        </p:nvSpPr>
+        <p:spPr>
+          <a:xfrm>
+            <a:off x="457200" y="540781"/>
+            <a:ext cx="8229600" cy="4545569"/>
+          </a:xfrm>
+        </p:spPr>
+        <p:txBody>
+          <a:bodyPr>
+            <a:normAutofit fontScale="55000" lnSpcReduction="20000"/>
+          </a:bodyPr>
+          <a:lstStyle/>
+          <a:p>
+            <a:pPr marL="0" lvl="0" indent="0">
+              <a:buNone/>
+            </a:pPr>
+            <a:r>
+              <a:rPr dirty="0"/>
+              <a:t>Sampling model defined by this code:</a:t>
+            </a:r>
+            <a:endParaRPr lang="en-US" dirty="0"/>
+          </a:p>
+          <a:p>
+            <a:pPr marL="0" lvl="0" indent="0">
+              <a:buNone/>
+            </a:pPr>
+            <a:endParaRPr lang="en-US" dirty="0">
+              <a:latin typeface="Courier"/>
+            </a:endParaRPr>
+          </a:p>
+          <a:p>
+            <a:pPr marL="0" lvl="0" indent="0">
+              <a:buNone/>
+            </a:pPr>
+            <a:r>
+              <a:rPr lang="en-US" dirty="0">
+                <a:latin typeface="Courier"/>
+              </a:rPr>
+              <a:t>with </a:t>
+            </a:r>
+            <a:r>
+              <a:rPr lang="en-US" dirty="0" err="1">
+                <a:latin typeface="Courier"/>
+              </a:rPr>
+              <a:t>pm.Model</a:t>
+            </a:r>
+            <a:r>
+              <a:rPr lang="en-US" dirty="0">
+                <a:latin typeface="Courier"/>
+              </a:rPr>
+              <a:t>(coords=coords) as </a:t>
+            </a:r>
+            <a:r>
+              <a:rPr lang="en-US" dirty="0" err="1">
+                <a:latin typeface="Courier"/>
+              </a:rPr>
+              <a:t>unpooled_model</a:t>
+            </a:r>
+            <a:r>
+              <a:rPr lang="en-US" dirty="0">
+                <a:latin typeface="Courier"/>
+              </a:rPr>
+              <a:t>:</a:t>
+            </a:r>
+            <a:endParaRPr dirty="0">
+              <a:latin typeface="Courier"/>
+            </a:endParaRPr>
+          </a:p>
+          <a:p>
+            <a:pPr lvl="0" indent="0">
+              <a:buNone/>
+            </a:pPr>
+            <a:r>
+              <a:rPr lang="en-US" b="1" dirty="0">
+                <a:solidFill>
+                  <a:srgbClr val="007020"/>
+                </a:solidFill>
+                <a:latin typeface="Courier"/>
+              </a:rPr>
+              <a:t># Independent parameters for each county    </a:t>
+            </a:r>
+          </a:p>
+          <a:p>
+            <a:pPr lvl="0" indent="0">
+              <a:buNone/>
+            </a:pPr>
+            <a:r>
+              <a:rPr lang="en-US" b="1" dirty="0" err="1">
+                <a:latin typeface="Courier"/>
+              </a:rPr>
+              <a:t>county_idx</a:t>
+            </a:r>
+            <a:r>
+              <a:rPr lang="en-US" b="1" dirty="0">
+                <a:latin typeface="Courier"/>
+              </a:rPr>
+              <a:t> = </a:t>
+            </a:r>
+            <a:r>
+              <a:rPr lang="en-US" b="1" dirty="0" err="1">
+                <a:latin typeface="Courier"/>
+              </a:rPr>
+              <a:t>pm.Data</a:t>
+            </a:r>
+            <a:r>
+              <a:rPr lang="en-US" b="1" dirty="0">
+                <a:latin typeface="Courier"/>
+              </a:rPr>
+              <a:t>("</a:t>
+            </a:r>
+            <a:r>
+              <a:rPr lang="en-US" b="1" dirty="0" err="1">
+                <a:latin typeface="Courier"/>
+              </a:rPr>
+              <a:t>county_idx</a:t>
+            </a:r>
+            <a:r>
+              <a:rPr lang="en-US" b="1" dirty="0">
+                <a:latin typeface="Courier"/>
+              </a:rPr>
+              <a:t>", </a:t>
+            </a:r>
+            <a:r>
+              <a:rPr lang="en-US" b="1" dirty="0" err="1">
+                <a:latin typeface="Courier"/>
+              </a:rPr>
+              <a:t>county_idxs</a:t>
+            </a:r>
+            <a:r>
+              <a:rPr lang="en-US" b="1" dirty="0">
+                <a:latin typeface="Courier"/>
+              </a:rPr>
+              <a:t>, dims="</a:t>
+            </a:r>
+            <a:r>
+              <a:rPr lang="en-US" b="1" dirty="0" err="1">
+                <a:latin typeface="Courier"/>
+              </a:rPr>
+              <a:t>obs_id</a:t>
+            </a:r>
+            <a:r>
+              <a:rPr lang="en-US" b="1" dirty="0">
+                <a:latin typeface="Courier"/>
+              </a:rPr>
+              <a:t>")    </a:t>
+            </a:r>
+          </a:p>
+          <a:p>
+            <a:pPr lvl="0" indent="0">
+              <a:buNone/>
+            </a:pPr>
+            <a:r>
+              <a:rPr lang="en-US" b="1" dirty="0">
+                <a:latin typeface="Courier"/>
+              </a:rPr>
+              <a:t>floor = </a:t>
+            </a:r>
+            <a:r>
+              <a:rPr lang="en-US" b="1" dirty="0" err="1">
+                <a:latin typeface="Courier"/>
+              </a:rPr>
+              <a:t>pm.Data</a:t>
+            </a:r>
+            <a:r>
+              <a:rPr lang="en-US" b="1" dirty="0">
+                <a:latin typeface="Courier"/>
+              </a:rPr>
+              <a:t>("floor", </a:t>
+            </a:r>
+            <a:r>
+              <a:rPr lang="en-US" b="1" dirty="0" err="1">
+                <a:latin typeface="Courier"/>
+              </a:rPr>
+              <a:t>radon_data.floor.values</a:t>
+            </a:r>
+            <a:r>
+              <a:rPr lang="en-US" b="1" dirty="0">
+                <a:latin typeface="Courier"/>
+              </a:rPr>
+              <a:t>, dims="</a:t>
+            </a:r>
+            <a:r>
+              <a:rPr lang="en-US" b="1" dirty="0" err="1">
+                <a:latin typeface="Courier"/>
+              </a:rPr>
+              <a:t>obs_id</a:t>
+            </a:r>
+            <a:r>
+              <a:rPr lang="en-US" b="1" dirty="0">
+                <a:latin typeface="Courier"/>
+              </a:rPr>
+              <a:t>", mutable=True)    </a:t>
+            </a:r>
+          </a:p>
+          <a:p>
+            <a:pPr lvl="0" indent="0">
+              <a:buNone/>
+            </a:pPr>
+            <a:endParaRPr lang="en-US" b="1" dirty="0">
+              <a:solidFill>
+                <a:srgbClr val="007020"/>
+              </a:solidFill>
+              <a:latin typeface="Courier"/>
+            </a:endParaRPr>
+          </a:p>
+          <a:p>
+            <a:pPr lvl="0" indent="0">
+              <a:buNone/>
+            </a:pPr>
+            <a:r>
+              <a:rPr lang="en-US" b="1" dirty="0">
+                <a:solidFill>
+                  <a:srgbClr val="007020"/>
+                </a:solidFill>
+                <a:latin typeface="Courier"/>
+              </a:rPr>
+              <a:t># Beta coefficient priors for each county </a:t>
+            </a:r>
+          </a:p>
+          <a:p>
+            <a:pPr lvl="0" indent="0">
+              <a:buNone/>
+            </a:pPr>
+            <a:r>
+              <a:rPr lang="en-US" b="1" dirty="0">
+                <a:latin typeface="Courier"/>
+              </a:rPr>
+              <a:t>a = </a:t>
+            </a:r>
+            <a:r>
+              <a:rPr lang="en-US" b="1" dirty="0" err="1">
+                <a:latin typeface="Courier"/>
+              </a:rPr>
+              <a:t>pm.Normal</a:t>
+            </a:r>
+            <a:r>
+              <a:rPr lang="en-US" b="1" dirty="0">
+                <a:latin typeface="Courier"/>
+              </a:rPr>
+              <a:t>("a", 0, sigma=100, dims="county")    </a:t>
+            </a:r>
+          </a:p>
+          <a:p>
+            <a:pPr lvl="0" indent="0">
+              <a:buNone/>
+            </a:pPr>
+            <a:r>
+              <a:rPr lang="en-US" b="1" dirty="0">
+                <a:latin typeface="Courier"/>
+              </a:rPr>
+              <a:t>b = </a:t>
+            </a:r>
+            <a:r>
+              <a:rPr lang="en-US" b="1" dirty="0" err="1">
+                <a:latin typeface="Courier"/>
+              </a:rPr>
+              <a:t>pm.Normal</a:t>
+            </a:r>
+            <a:r>
+              <a:rPr lang="en-US" b="1" dirty="0">
+                <a:latin typeface="Courier"/>
+              </a:rPr>
+              <a:t>("b", 0, sigma=100, dims="county")    </a:t>
+            </a:r>
+          </a:p>
+          <a:p>
+            <a:pPr lvl="0" indent="0">
+              <a:buNone/>
+            </a:pPr>
+            <a:endParaRPr lang="en-US" b="1" dirty="0">
+              <a:solidFill>
+                <a:srgbClr val="007020"/>
+              </a:solidFill>
+              <a:latin typeface="Courier"/>
+            </a:endParaRPr>
+          </a:p>
+          <a:p>
+            <a:pPr lvl="0" indent="0">
+              <a:buNone/>
+            </a:pPr>
+            <a:r>
+              <a:rPr lang="en-US" b="1" dirty="0">
+                <a:solidFill>
+                  <a:srgbClr val="007020"/>
+                </a:solidFill>
+                <a:latin typeface="Courier"/>
+              </a:rPr>
+              <a:t># Model error prior </a:t>
+            </a:r>
+          </a:p>
+          <a:p>
+            <a:pPr lvl="0" indent="0">
+              <a:buNone/>
+            </a:pPr>
+            <a:r>
+              <a:rPr lang="en-US" b="1" dirty="0">
+                <a:latin typeface="Courier"/>
+              </a:rPr>
+              <a:t>eps = </a:t>
+            </a:r>
+            <a:r>
+              <a:rPr lang="en-US" b="1" dirty="0" err="1">
+                <a:latin typeface="Courier"/>
+              </a:rPr>
+              <a:t>pm.HalfCauchy</a:t>
+            </a:r>
+            <a:r>
+              <a:rPr lang="en-US" b="1" dirty="0">
+                <a:latin typeface="Courier"/>
+              </a:rPr>
+              <a:t>("eps", 5)    </a:t>
+            </a:r>
+          </a:p>
+          <a:p>
+            <a:pPr lvl="0" indent="0">
+              <a:buNone/>
+            </a:pPr>
+            <a:endParaRPr lang="en-US" b="1" dirty="0">
+              <a:solidFill>
+                <a:srgbClr val="007020"/>
+              </a:solidFill>
+              <a:latin typeface="Courier"/>
+            </a:endParaRPr>
+          </a:p>
+          <a:p>
+            <a:pPr lvl="0" indent="0">
+              <a:buNone/>
+            </a:pPr>
+            <a:r>
+              <a:rPr lang="en-US" b="1" dirty="0">
+                <a:solidFill>
+                  <a:srgbClr val="007020"/>
+                </a:solidFill>
+                <a:latin typeface="Courier"/>
+              </a:rPr>
+              <a:t># Model prediction of radon level by </a:t>
+            </a:r>
+            <a:r>
+              <a:rPr lang="en-US" b="1" dirty="0" err="1">
+                <a:solidFill>
+                  <a:srgbClr val="007020"/>
+                </a:solidFill>
+                <a:latin typeface="Courier"/>
+              </a:rPr>
+              <a:t>county_idx</a:t>
+            </a:r>
+            <a:r>
+              <a:rPr lang="en-US" b="1" dirty="0">
+                <a:solidFill>
+                  <a:srgbClr val="007020"/>
+                </a:solidFill>
+                <a:latin typeface="Courier"/>
+              </a:rPr>
+              <a:t> translates to </a:t>
+            </a:r>
+          </a:p>
+          <a:p>
+            <a:pPr lvl="0" indent="0">
+              <a:buNone/>
+            </a:pPr>
+            <a:r>
+              <a:rPr lang="en-US" b="1" dirty="0">
+                <a:solidFill>
+                  <a:srgbClr val="007020"/>
+                </a:solidFill>
+                <a:latin typeface="Courier"/>
+              </a:rPr>
+              <a:t>#[0, 0, 0, 1, 1, ...], we link multiple household measures in a county    </a:t>
+            </a:r>
+          </a:p>
+          <a:p>
+            <a:pPr lvl="0" indent="0">
+              <a:buNone/>
+            </a:pPr>
+            <a:r>
+              <a:rPr lang="en-US" b="1" dirty="0">
+                <a:solidFill>
+                  <a:srgbClr val="007020"/>
+                </a:solidFill>
+                <a:latin typeface="Courier"/>
+              </a:rPr>
+              <a:t># to </a:t>
+            </a:r>
+            <a:r>
+              <a:rPr lang="en-US" b="1" dirty="0" err="1">
+                <a:solidFill>
+                  <a:srgbClr val="007020"/>
+                </a:solidFill>
+                <a:latin typeface="Courier"/>
+              </a:rPr>
+              <a:t>unpooled</a:t>
+            </a:r>
+            <a:r>
+              <a:rPr lang="en-US" b="1" dirty="0">
+                <a:solidFill>
+                  <a:srgbClr val="007020"/>
+                </a:solidFill>
+                <a:latin typeface="Courier"/>
+              </a:rPr>
+              <a:t> coefficients.    </a:t>
+            </a:r>
+          </a:p>
+          <a:p>
+            <a:pPr lvl="0" indent="0">
+              <a:buNone/>
+            </a:pPr>
+            <a:r>
+              <a:rPr lang="en-US" b="1" dirty="0" err="1">
+                <a:latin typeface="Courier"/>
+              </a:rPr>
+              <a:t>radon_est</a:t>
+            </a:r>
+            <a:r>
+              <a:rPr lang="en-US" b="1" dirty="0">
+                <a:latin typeface="Courier"/>
+              </a:rPr>
+              <a:t> = a[</a:t>
+            </a:r>
+            <a:r>
+              <a:rPr lang="en-US" b="1" dirty="0" err="1">
+                <a:latin typeface="Courier"/>
+              </a:rPr>
+              <a:t>county_idx</a:t>
+            </a:r>
+            <a:r>
+              <a:rPr lang="en-US" b="1" dirty="0">
+                <a:latin typeface="Courier"/>
+              </a:rPr>
+              <a:t>] + b[</a:t>
+            </a:r>
+            <a:r>
+              <a:rPr lang="en-US" b="1" dirty="0" err="1">
+                <a:latin typeface="Courier"/>
+              </a:rPr>
+              <a:t>county_idx</a:t>
+            </a:r>
+            <a:r>
+              <a:rPr lang="en-US" b="1" dirty="0">
+                <a:latin typeface="Courier"/>
+              </a:rPr>
+              <a:t>] * floor    </a:t>
+            </a:r>
+          </a:p>
+          <a:p>
+            <a:pPr lvl="0" indent="0">
+              <a:buNone/>
+            </a:pPr>
+            <a:endParaRPr lang="en-US" b="1" dirty="0">
+              <a:latin typeface="Courier"/>
+            </a:endParaRPr>
+          </a:p>
+          <a:p>
+            <a:pPr lvl="0" indent="0">
+              <a:buNone/>
+            </a:pPr>
+            <a:r>
+              <a:rPr lang="en-US" b="1" dirty="0">
+                <a:solidFill>
+                  <a:srgbClr val="007020"/>
+                </a:solidFill>
+                <a:latin typeface="Courier"/>
+              </a:rPr>
+              <a:t># Data likelihood    </a:t>
+            </a:r>
+          </a:p>
+          <a:p>
+            <a:pPr lvl="0" indent="0">
+              <a:buNone/>
+            </a:pPr>
+            <a:r>
+              <a:rPr lang="en-US" b="1" dirty="0">
+                <a:latin typeface="Courier"/>
+              </a:rPr>
+              <a:t>y = </a:t>
+            </a:r>
+            <a:r>
+              <a:rPr lang="en-US" b="1" dirty="0" err="1">
+                <a:latin typeface="Courier"/>
+              </a:rPr>
+              <a:t>pm.Normal</a:t>
+            </a:r>
+            <a:r>
+              <a:rPr lang="en-US" b="1" dirty="0">
+                <a:latin typeface="Courier"/>
+              </a:rPr>
+              <a:t>("y", </a:t>
+            </a:r>
+            <a:r>
+              <a:rPr lang="en-US" b="1" dirty="0" err="1">
+                <a:latin typeface="Courier"/>
+              </a:rPr>
+              <a:t>radon_est</a:t>
+            </a:r>
+            <a:r>
+              <a:rPr lang="en-US" b="1" dirty="0">
+                <a:latin typeface="Courier"/>
+              </a:rPr>
+              <a:t>, sigma=eps, observed=</a:t>
+            </a:r>
+            <a:r>
+              <a:rPr lang="en-US" b="1" dirty="0" err="1">
+                <a:latin typeface="Courier"/>
+              </a:rPr>
+              <a:t>radon_data.log_radon</a:t>
+            </a:r>
+            <a:r>
+              <a:rPr lang="en-US" b="1" dirty="0">
+                <a:latin typeface="Courier"/>
+              </a:rPr>
+              <a:t>, dims="</a:t>
+            </a:r>
+            <a:r>
+              <a:rPr lang="en-US" b="1" dirty="0" err="1">
+                <a:latin typeface="Courier"/>
+              </a:rPr>
+              <a:t>obs_id</a:t>
+            </a:r>
+            <a:r>
+              <a:rPr lang="en-US" b="1" dirty="0">
+                <a:latin typeface="Courier"/>
+              </a:rPr>
+              <a:t>")</a:t>
+            </a:r>
+            <a:endParaRPr dirty="0">
+              <a:latin typeface="Courier"/>
+            </a:endParaRPr>
+          </a:p>
+        </p:txBody>
+      </p:sp>
+    </p:spTree>
+    <p:extLst>
+      <p:ext uri="{BB962C8B-B14F-4D97-AF65-F5344CB8AC3E}">
+        <p14:creationId xmlns:p14="http://schemas.microsoft.com/office/powerpoint/2010/main" val="4096385048"/>
+      </p:ext>
+    </p:extLst>
+  </p:cSld>
+  <p:clrMapOvr>
+    <a:masterClrMapping/>
+  </p:clrMapOvr>
+</p:sld>
+</file>
+
+<file path=ppt/slides/slide25.xml><?xml version="1.0" encoding="utf-8"?>
+<p:sld xmlns:a="http://schemas.openxmlformats.org/drawingml/2006/main" xmlns:r="http://schemas.openxmlformats.org/officeDocument/2006/relationships" xmlns:p="http://schemas.openxmlformats.org/presentationml/2006/main">
+  <p:cSld>
+    <p:spTree>
+      <p:nvGrpSpPr>
+        <p:cNvPr id="1" name="">
+          <a:extLst>
+            <a:ext uri="{FF2B5EF4-FFF2-40B4-BE49-F238E27FC236}">
+              <a16:creationId xmlns:a16="http://schemas.microsoft.com/office/drawing/2014/main" id="{C38EB784-8CA8-513D-B361-A68E7A5C7A0C}"/>
+            </a:ext>
+          </a:extLst>
+        </p:cNvPr>
+        <p:cNvGrpSpPr/>
+        <p:nvPr/>
+      </p:nvGrpSpPr>
+      <p:grpSpPr>
+        <a:xfrm>
+          <a:off x="0" y="0"/>
+          <a:ext cx="0" cy="0"/>
+          <a:chOff x="0" y="0"/>
+          <a:chExt cx="0" cy="0"/>
+        </a:xfrm>
+      </p:grpSpPr>
+      <p:sp>
+        <p:nvSpPr>
+          <p:cNvPr id="2" name="Title 1">
+            <a:extLst>
+              <a:ext uri="{FF2B5EF4-FFF2-40B4-BE49-F238E27FC236}">
+                <a16:creationId xmlns:a16="http://schemas.microsoft.com/office/drawing/2014/main" id="{07AFC9E4-3C54-0453-0842-EF399924F176}"/>
+              </a:ext>
+            </a:extLst>
+          </p:cNvPr>
+          <p:cNvSpPr>
+            <a:spLocks noGrp="1"/>
+          </p:cNvSpPr>
+          <p:nvPr>
+            <p:ph type="title"/>
+          </p:nvPr>
+        </p:nvSpPr>
+        <p:spPr/>
+        <p:txBody>
+          <a:bodyPr/>
+          <a:lstStyle/>
+          <a:p>
+            <a:pPr marL="0" lvl="0" indent="0">
+              <a:buNone/>
+            </a:pPr>
+            <a:r>
+              <a:rPr dirty="0"/>
+              <a:t>Sampling the Pooled Model</a:t>
+            </a:r>
+          </a:p>
+        </p:txBody>
+      </p:sp>
+      <p:sp>
+        <p:nvSpPr>
+          <p:cNvPr id="3" name="Content Placeholder 2">
+            <a:extLst>
+              <a:ext uri="{FF2B5EF4-FFF2-40B4-BE49-F238E27FC236}">
+                <a16:creationId xmlns:a16="http://schemas.microsoft.com/office/drawing/2014/main" id="{8D435693-6340-A79A-C263-EB7B350A39BE}"/>
+              </a:ext>
+            </a:extLst>
+          </p:cNvPr>
+          <p:cNvSpPr>
+            <a:spLocks noGrp="1"/>
+          </p:cNvSpPr>
+          <p:nvPr>
+            <p:ph idx="1"/>
+          </p:nvPr>
+        </p:nvSpPr>
+        <p:spPr>
+          <a:xfrm>
+            <a:off x="430530" y="980330"/>
+            <a:ext cx="8229600" cy="613409"/>
+          </a:xfrm>
+        </p:spPr>
+        <p:txBody>
+          <a:bodyPr>
+            <a:normAutofit fontScale="85000" lnSpcReduction="20000"/>
+          </a:bodyPr>
+          <a:lstStyle/>
+          <a:p>
+            <a:pPr marL="0" lvl="0" indent="0">
+              <a:buNone/>
+            </a:pPr>
+            <a:r>
+              <a:rPr dirty="0"/>
+              <a:t>The sampling traces</a:t>
+            </a:r>
+            <a:r>
+              <a:rPr lang="en-US" dirty="0"/>
+              <a:t> show </a:t>
+            </a:r>
+            <a:r>
+              <a:rPr lang="en-US" b="1" dirty="0"/>
+              <a:t>independent values by county </a:t>
+            </a:r>
+            <a:r>
+              <a:rPr lang="en-US" dirty="0"/>
+              <a:t>for two of </a:t>
+            </a:r>
+            <a:r>
+              <a:rPr dirty="0"/>
+              <a:t>t</a:t>
+            </a:r>
+            <a:r>
+              <a:rPr lang="en-US" dirty="0"/>
+              <a:t>hree</a:t>
+            </a:r>
+            <a:r>
+              <a:rPr dirty="0"/>
+              <a:t> coefficients</a:t>
+            </a:r>
+          </a:p>
+        </p:txBody>
+      </p:sp>
+      <p:pic>
+        <p:nvPicPr>
+          <p:cNvPr id="5" name="Picture 4">
+            <a:extLst>
+              <a:ext uri="{FF2B5EF4-FFF2-40B4-BE49-F238E27FC236}">
+                <a16:creationId xmlns:a16="http://schemas.microsoft.com/office/drawing/2014/main" id="{E2D79B1B-0CB9-9FC4-83E0-962910D7C0E6}"/>
+              </a:ext>
+            </a:extLst>
+          </p:cNvPr>
+          <p:cNvPicPr>
+            <a:picLocks noChangeAspect="1"/>
+          </p:cNvPicPr>
+          <p:nvPr/>
+        </p:nvPicPr>
+        <p:blipFill>
+          <a:blip r:embed="rId2"/>
+          <a:stretch>
+            <a:fillRect/>
+          </a:stretch>
+        </p:blipFill>
+        <p:spPr>
+          <a:xfrm>
+            <a:off x="2736816" y="1711739"/>
+            <a:ext cx="6372894" cy="3165061"/>
+          </a:xfrm>
+          <a:prstGeom prst="rect">
+            <a:avLst/>
+          </a:prstGeom>
+        </p:spPr>
+      </p:pic>
+      <mc:AlternateContent xmlns:mc="http://schemas.openxmlformats.org/markup-compatibility/2006">
+        <mc:Choice xmlns:a14="http://schemas.microsoft.com/office/drawing/2010/main" Requires="a14">
+          <p:sp>
+            <p:nvSpPr>
+              <p:cNvPr id="6" name="Text Placeholder 3">
+                <a:extLst>
+                  <a:ext uri="{FF2B5EF4-FFF2-40B4-BE49-F238E27FC236}">
+                    <a16:creationId xmlns:a16="http://schemas.microsoft.com/office/drawing/2014/main" id="{75C1A475-4B32-0C7A-B9DD-4D474E495F4C}"/>
+                  </a:ext>
+                </a:extLst>
+              </p:cNvPr>
+              <p:cNvSpPr txBox="1">
+                <a:spLocks/>
+              </p:cNvSpPr>
+              <p:nvPr/>
+            </p:nvSpPr>
+            <p:spPr>
+              <a:xfrm>
+                <a:off x="381000" y="1772460"/>
+                <a:ext cx="2225040" cy="3165061"/>
+              </a:xfrm>
+              <a:prstGeom prst="rect">
+                <a:avLst/>
+              </a:prstGeom>
+            </p:spPr>
+            <p:txBody>
+              <a:bodyPr>
+                <a:noAutofit/>
+              </a:bodyPr>
+              <a:lstStyle>
+                <a:lvl1pPr marL="342900" indent="-342900" algn="l" defTabSz="342900" rtl="0" eaLnBrk="1" latinLnBrk="0" hangingPunct="1">
+                  <a:spcBef>
+                    <a:spcPct val="20000"/>
+                  </a:spcBef>
+                  <a:buFont typeface="Arial"/>
+                  <a:buChar char="•"/>
+                  <a:defRPr sz="2400" kern="1200">
+                    <a:solidFill>
+                      <a:schemeClr val="tx1"/>
+                    </a:solidFill>
+                    <a:latin typeface="+mn-lt"/>
+                    <a:ea typeface="+mn-ea"/>
+                    <a:cs typeface="+mn-cs"/>
+                  </a:defRPr>
+                </a:lvl1pPr>
+                <a:lvl2pPr marL="685800" indent="-342900" algn="l" defTabSz="342900" rtl="0" eaLnBrk="1" latinLnBrk="0" hangingPunct="1">
+                  <a:spcBef>
+                    <a:spcPct val="20000"/>
+                  </a:spcBef>
+                  <a:buFont typeface="Arial"/>
+                  <a:buChar char="–"/>
+                  <a:defRPr sz="2100" kern="1200">
+                    <a:solidFill>
+                      <a:schemeClr val="tx1"/>
+                    </a:solidFill>
+                    <a:latin typeface="+mn-lt"/>
+                    <a:ea typeface="+mn-ea"/>
+                    <a:cs typeface="+mn-cs"/>
+                  </a:defRPr>
+                </a:lvl2pPr>
+                <a:lvl3pPr marL="1028700" indent="-342900" algn="l" defTabSz="342900" rtl="0" eaLnBrk="1" latinLnBrk="0" hangingPunct="1">
+                  <a:spcBef>
+                    <a:spcPct val="20000"/>
+                  </a:spcBef>
+                  <a:buFont typeface="Arial"/>
+                  <a:buChar char="•"/>
+                  <a:defRPr sz="1800" kern="1200">
+                    <a:solidFill>
+                      <a:schemeClr val="tx1"/>
+                    </a:solidFill>
+                    <a:latin typeface="+mn-lt"/>
+                    <a:ea typeface="+mn-ea"/>
+                    <a:cs typeface="+mn-cs"/>
+                  </a:defRPr>
+                </a:lvl3pPr>
+                <a:lvl4pPr marL="1371600" indent="-342900" algn="l" defTabSz="342900" rtl="0" eaLnBrk="1" latinLnBrk="0" hangingPunct="1">
+                  <a:spcBef>
+                    <a:spcPct val="20000"/>
+                  </a:spcBef>
+                  <a:buFont typeface="Arial"/>
+                  <a:buChar char="–"/>
+                  <a:defRPr sz="1500" kern="1200">
+                    <a:solidFill>
+                      <a:schemeClr val="tx1"/>
+                    </a:solidFill>
+                    <a:latin typeface="+mn-lt"/>
+                    <a:ea typeface="+mn-ea"/>
+                    <a:cs typeface="+mn-cs"/>
+                  </a:defRPr>
+                </a:lvl4pPr>
+                <a:lvl5pPr marL="1714500" indent="-342900" algn="l" defTabSz="342900" rtl="0" eaLnBrk="1" latinLnBrk="0" hangingPunct="1">
+                  <a:spcBef>
+                    <a:spcPct val="20000"/>
+                  </a:spcBef>
+                  <a:buFont typeface="Arial"/>
+                  <a:buChar char="»"/>
+                  <a:defRPr sz="1500" kern="1200">
+                    <a:solidFill>
+                      <a:schemeClr val="tx1"/>
+                    </a:solidFill>
+                    <a:latin typeface="+mn-lt"/>
+                    <a:ea typeface="+mn-ea"/>
+                    <a:cs typeface="+mn-cs"/>
+                  </a:defRPr>
+                </a:lvl5pPr>
+                <a:lvl6pPr marL="2057400" indent="-342900" algn="l" defTabSz="342900" rtl="0" eaLnBrk="1" latinLnBrk="0" hangingPunct="1">
+                  <a:spcBef>
+                    <a:spcPct val="20000"/>
+                  </a:spcBef>
+                  <a:buFont typeface="Arial"/>
+                  <a:buChar char="•"/>
+                  <a:defRPr sz="1500" kern="1200">
+                    <a:solidFill>
+                      <a:schemeClr val="tx1"/>
+                    </a:solidFill>
+                    <a:latin typeface="+mn-lt"/>
+                    <a:ea typeface="+mn-ea"/>
+                    <a:cs typeface="+mn-cs"/>
+                  </a:defRPr>
+                </a:lvl6pPr>
+                <a:lvl7pPr marL="2400300" indent="-342900" algn="l" defTabSz="342900" rtl="0" eaLnBrk="1" latinLnBrk="0" hangingPunct="1">
+                  <a:spcBef>
+                    <a:spcPct val="20000"/>
+                  </a:spcBef>
+                  <a:buFont typeface="Arial"/>
+                  <a:buChar char="•"/>
+                  <a:defRPr sz="1500" kern="1200">
+                    <a:solidFill>
+                      <a:schemeClr val="tx1"/>
+                    </a:solidFill>
+                    <a:latin typeface="+mn-lt"/>
+                    <a:ea typeface="+mn-ea"/>
+                    <a:cs typeface="+mn-cs"/>
+                  </a:defRPr>
+                </a:lvl7pPr>
+                <a:lvl8pPr marL="2743200" indent="-342900" algn="l" defTabSz="342900" rtl="0" eaLnBrk="1" latinLnBrk="0" hangingPunct="1">
+                  <a:spcBef>
+                    <a:spcPct val="20000"/>
+                  </a:spcBef>
+                  <a:buFont typeface="Arial"/>
+                  <a:buChar char="•"/>
+                  <a:defRPr sz="1500" kern="1200">
+                    <a:solidFill>
+                      <a:schemeClr val="tx1"/>
+                    </a:solidFill>
+                    <a:latin typeface="+mn-lt"/>
+                    <a:ea typeface="+mn-ea"/>
+                    <a:cs typeface="+mn-cs"/>
+                  </a:defRPr>
+                </a:lvl8pPr>
+                <a:lvl9pPr marL="3086100" indent="-342900" algn="l" defTabSz="342900" rtl="0" eaLnBrk="1" latinLnBrk="0" hangingPunct="1">
+                  <a:spcBef>
+                    <a:spcPct val="20000"/>
+                  </a:spcBef>
+                  <a:buFont typeface="Arial"/>
+                  <a:buChar char="•"/>
+                  <a:defRPr sz="1500" kern="1200">
+                    <a:solidFill>
+                      <a:schemeClr val="tx1"/>
+                    </a:solidFill>
+                    <a:latin typeface="+mn-lt"/>
+                    <a:ea typeface="+mn-ea"/>
+                    <a:cs typeface="+mn-cs"/>
+                  </a:defRPr>
+                </a:lvl9pPr>
+              </a:lstStyle>
+              <a:p>
+                <a14:m>
+                  <m:oMath xmlns:m="http://schemas.openxmlformats.org/officeDocument/2006/math">
+                    <m:sSub>
+                      <m:sSubPr>
+                        <m:ctrlPr>
+                          <a:rPr lang="en-US" sz="2000" i="1" smtClean="0">
+                            <a:latin typeface="Cambria Math" panose="02040503050406030204" pitchFamily="18" charset="0"/>
+                            <a:ea typeface="Cambria Math" panose="02040503050406030204" pitchFamily="18" charset="0"/>
+                          </a:rPr>
+                        </m:ctrlPr>
+                      </m:sSubPr>
+                      <m:e>
+                        <m:r>
+                          <a:rPr lang="en-US" sz="2000" i="1">
+                            <a:latin typeface="Cambria Math" panose="02040503050406030204" pitchFamily="18" charset="0"/>
+                            <a:ea typeface="Cambria Math" panose="02040503050406030204" pitchFamily="18" charset="0"/>
+                          </a:rPr>
+                          <m:t>𝛽</m:t>
+                        </m:r>
+                      </m:e>
+                      <m:sub>
+                        <m:r>
+                          <a:rPr lang="en-US" sz="2000" i="1">
+                            <a:latin typeface="Cambria Math" panose="02040503050406030204" pitchFamily="18" charset="0"/>
+                            <a:ea typeface="Cambria Math" panose="02040503050406030204" pitchFamily="18" charset="0"/>
+                          </a:rPr>
+                          <m:t>0</m:t>
+                        </m:r>
+                        <m:r>
+                          <a:rPr lang="en-US" sz="2000" i="1">
+                            <a:latin typeface="Cambria Math" panose="02040503050406030204" pitchFamily="18" charset="0"/>
+                            <a:ea typeface="Cambria Math" panose="02040503050406030204" pitchFamily="18" charset="0"/>
+                          </a:rPr>
+                          <m:t>,</m:t>
+                        </m:r>
+                        <m:r>
+                          <a:rPr lang="en-US" sz="2000" i="1">
+                            <a:latin typeface="Cambria Math" panose="02040503050406030204" pitchFamily="18" charset="0"/>
+                            <a:ea typeface="Cambria Math" panose="02040503050406030204" pitchFamily="18" charset="0"/>
+                          </a:rPr>
+                          <m:t>𝑐</m:t>
+                        </m:r>
+                      </m:sub>
+                    </m:sSub>
+                  </m:oMath>
+                </a14:m>
+                <a:r>
+                  <a:rPr lang="en-US" sz="2000" dirty="0"/>
+                  <a:t> are quite different by county</a:t>
+                </a:r>
+              </a:p>
+              <a:p>
+                <a:pPr>
+                  <a:buFont typeface="Arial" panose="020B0604020202020204" pitchFamily="34" charset="0"/>
+                  <a:buChar char="•"/>
+                </a:pPr>
+                <a:r>
+                  <a:rPr lang="en-US" sz="2000" dirty="0">
+                    <a:ea typeface="Cambria Math" panose="02040503050406030204" pitchFamily="18" charset="0"/>
+                  </a:rPr>
+                  <a:t>Slope, </a:t>
+                </a:r>
+                <a14:m>
+                  <m:oMath xmlns:m="http://schemas.openxmlformats.org/officeDocument/2006/math">
+                    <m:sSub>
+                      <m:sSubPr>
+                        <m:ctrlPr>
+                          <a:rPr lang="en-US" sz="2000" i="1">
+                            <a:latin typeface="Cambria Math" panose="02040503050406030204" pitchFamily="18" charset="0"/>
+                            <a:ea typeface="Cambria Math" panose="02040503050406030204" pitchFamily="18" charset="0"/>
+                          </a:rPr>
+                        </m:ctrlPr>
+                      </m:sSubPr>
+                      <m:e>
+                        <m:r>
+                          <a:rPr lang="en-US" sz="2000" i="1">
+                            <a:latin typeface="Cambria Math" panose="02040503050406030204" pitchFamily="18" charset="0"/>
+                            <a:ea typeface="Cambria Math" panose="02040503050406030204" pitchFamily="18" charset="0"/>
+                          </a:rPr>
+                          <m:t>𝛽</m:t>
+                        </m:r>
+                      </m:e>
+                      <m:sub>
+                        <m:r>
+                          <a:rPr lang="en-US" sz="2000" i="1">
+                            <a:latin typeface="Cambria Math" panose="02040503050406030204" pitchFamily="18" charset="0"/>
+                            <a:ea typeface="Cambria Math" panose="02040503050406030204" pitchFamily="18" charset="0"/>
+                          </a:rPr>
+                          <m:t>1</m:t>
+                        </m:r>
+                        <m:r>
+                          <a:rPr lang="en-US" sz="2000" i="1">
+                            <a:latin typeface="Cambria Math" panose="02040503050406030204" pitchFamily="18" charset="0"/>
+                            <a:ea typeface="Cambria Math" panose="02040503050406030204" pitchFamily="18" charset="0"/>
+                          </a:rPr>
+                          <m:t>,</m:t>
+                        </m:r>
+                        <m:r>
+                          <a:rPr lang="en-US" sz="2000" i="1">
+                            <a:latin typeface="Cambria Math" panose="02040503050406030204" pitchFamily="18" charset="0"/>
+                            <a:ea typeface="Cambria Math" panose="02040503050406030204" pitchFamily="18" charset="0"/>
+                          </a:rPr>
+                          <m:t>𝑐</m:t>
+                        </m:r>
+                      </m:sub>
+                    </m:sSub>
+                    <m:r>
+                      <a:rPr lang="en-US" sz="2000" b="0" i="1" smtClean="0">
+                        <a:latin typeface="Cambria Math" panose="02040503050406030204" pitchFamily="18" charset="0"/>
+                        <a:ea typeface="Cambria Math" panose="02040503050406030204" pitchFamily="18" charset="0"/>
+                      </a:rPr>
+                      <m:t>,</m:t>
+                    </m:r>
+                  </m:oMath>
+                </a14:m>
+                <a:r>
+                  <a:rPr lang="en-US" sz="2000" dirty="0"/>
+                  <a:t> and similar between counties</a:t>
+                </a:r>
+              </a:p>
+              <a:p>
+                <a:pPr>
+                  <a:buFont typeface="Arial" panose="020B0604020202020204" pitchFamily="34" charset="0"/>
+                  <a:buChar char="•"/>
+                </a:pPr>
+                <a:r>
+                  <a:rPr lang="en-US" sz="2000" dirty="0"/>
+                  <a:t>Dispersion, </a:t>
+                </a:r>
+                <a14:m>
+                  <m:oMath xmlns:m="http://schemas.openxmlformats.org/officeDocument/2006/math">
+                    <m:r>
+                      <a:rPr lang="en-US" sz="2000" i="1" smtClean="0">
+                        <a:latin typeface="Cambria Math" panose="02040503050406030204" pitchFamily="18" charset="0"/>
+                        <a:ea typeface="Cambria Math" panose="02040503050406030204" pitchFamily="18" charset="0"/>
+                      </a:rPr>
+                      <m:t>𝜀</m:t>
+                    </m:r>
+                  </m:oMath>
+                </a14:m>
+                <a:r>
+                  <a:rPr lang="en-US" sz="2000" dirty="0"/>
+                  <a:t>, is pooled between counties</a:t>
+                </a:r>
+              </a:p>
+              <a:p>
+                <a:pPr>
+                  <a:buFont typeface="Arial" panose="020B0604020202020204" pitchFamily="34" charset="0"/>
+                  <a:buChar char="•"/>
+                </a:pPr>
+                <a:endParaRPr lang="ar-AE" sz="2000" dirty="0"/>
+              </a:p>
+            </p:txBody>
+          </p:sp>
+        </mc:Choice>
+        <mc:Fallback>
+          <p:sp>
+            <p:nvSpPr>
+              <p:cNvPr id="6" name="Text Placeholder 3">
+                <a:extLst>
+                  <a:ext uri="{FF2B5EF4-FFF2-40B4-BE49-F238E27FC236}">
+                    <a16:creationId xmlns:a16="http://schemas.microsoft.com/office/drawing/2014/main" id="{75C1A475-4B32-0C7A-B9DD-4D474E495F4C}"/>
+                  </a:ext>
+                </a:extLst>
+              </p:cNvPr>
+              <p:cNvSpPr txBox="1">
+                <a:spLocks noRot="1" noChangeAspect="1" noMove="1" noResize="1" noEditPoints="1" noAdjustHandles="1" noChangeArrowheads="1" noChangeShapeType="1" noTextEdit="1"/>
+              </p:cNvSpPr>
+              <p:nvPr/>
+            </p:nvSpPr>
+            <p:spPr>
+              <a:xfrm>
+                <a:off x="381000" y="1772460"/>
+                <a:ext cx="2225040" cy="3165061"/>
+              </a:xfrm>
+              <a:prstGeom prst="rect">
+                <a:avLst/>
+              </a:prstGeom>
+              <a:blipFill>
+                <a:blip r:embed="rId3"/>
+                <a:stretch>
+                  <a:fillRect l="-2466" t="-963" r="-4658"/>
+                </a:stretch>
+              </a:blipFill>
+            </p:spPr>
+            <p:txBody>
+              <a:bodyPr/>
+              <a:lstStyle/>
+              <a:p>
+                <a:r>
+                  <a:rPr lang="en-US">
+                    <a:noFill/>
+                  </a:rPr>
+                  <a:t> </a:t>
+                </a:r>
+              </a:p>
+            </p:txBody>
+          </p:sp>
+        </mc:Fallback>
+      </mc:AlternateContent>
+    </p:spTree>
+    <p:extLst>
+      <p:ext uri="{BB962C8B-B14F-4D97-AF65-F5344CB8AC3E}">
+        <p14:creationId xmlns:p14="http://schemas.microsoft.com/office/powerpoint/2010/main" val="1240764761"/>
+      </p:ext>
+    </p:extLst>
+  </p:cSld>
+  <p:clrMapOvr>
+    <a:masterClrMapping/>
+  </p:clrMapOvr>
+</p:sld>
+</file>
+
+<file path=ppt/slides/slide26.xml><?xml version="1.0" encoding="utf-8"?>
+<p:sld xmlns:a="http://schemas.openxmlformats.org/drawingml/2006/main" xmlns:r="http://schemas.openxmlformats.org/officeDocument/2006/relationships" xmlns:p="http://schemas.openxmlformats.org/presentationml/2006/main">
+  <p:cSld>
+    <p:spTree>
+      <p:nvGrpSpPr>
+        <p:cNvPr id="1" name="">
+          <a:extLst>
+            <a:ext uri="{FF2B5EF4-FFF2-40B4-BE49-F238E27FC236}">
+              <a16:creationId xmlns:a16="http://schemas.microsoft.com/office/drawing/2014/main" id="{7966484E-2B0B-C9F8-AAD9-A2B56C752D30}"/>
+            </a:ext>
+          </a:extLst>
+        </p:cNvPr>
+        <p:cNvGrpSpPr/>
+        <p:nvPr/>
+      </p:nvGrpSpPr>
+      <p:grpSpPr>
+        <a:xfrm>
+          <a:off x="0" y="0"/>
+          <a:ext cx="0" cy="0"/>
+          <a:chOff x="0" y="0"/>
+          <a:chExt cx="0" cy="0"/>
+        </a:xfrm>
+      </p:grpSpPr>
+      <p:sp>
+        <p:nvSpPr>
+          <p:cNvPr id="2" name="Title 1">
+            <a:extLst>
+              <a:ext uri="{FF2B5EF4-FFF2-40B4-BE49-F238E27FC236}">
+                <a16:creationId xmlns:a16="http://schemas.microsoft.com/office/drawing/2014/main" id="{7DC90CB9-DBA1-DBE7-F679-F4E240833047}"/>
+              </a:ext>
+            </a:extLst>
+          </p:cNvPr>
+          <p:cNvSpPr>
+            <a:spLocks noGrp="1"/>
+          </p:cNvSpPr>
+          <p:nvPr>
+            <p:ph type="title"/>
+          </p:nvPr>
+        </p:nvSpPr>
+        <p:spPr/>
+        <p:txBody>
+          <a:bodyPr/>
+          <a:lstStyle/>
+          <a:p>
+            <a:pPr marL="0" lvl="0" indent="0">
+              <a:buNone/>
+            </a:pPr>
+            <a:r>
+              <a:rPr dirty="0"/>
+              <a:t>Sampling the Pooled Model</a:t>
+            </a:r>
+          </a:p>
+        </p:txBody>
+      </p:sp>
+      <p:sp>
+        <p:nvSpPr>
+          <p:cNvPr id="3" name="Content Placeholder 2">
+            <a:extLst>
+              <a:ext uri="{FF2B5EF4-FFF2-40B4-BE49-F238E27FC236}">
+                <a16:creationId xmlns:a16="http://schemas.microsoft.com/office/drawing/2014/main" id="{41D8E0BC-564F-6438-332A-254C46595924}"/>
+              </a:ext>
+            </a:extLst>
+          </p:cNvPr>
+          <p:cNvSpPr>
+            <a:spLocks noGrp="1"/>
+          </p:cNvSpPr>
+          <p:nvPr>
+            <p:ph idx="1"/>
+          </p:nvPr>
+        </p:nvSpPr>
+        <p:spPr>
+          <a:xfrm>
+            <a:off x="430530" y="980330"/>
+            <a:ext cx="8229600" cy="613409"/>
+          </a:xfrm>
+        </p:spPr>
+        <p:txBody>
+          <a:bodyPr>
+            <a:normAutofit/>
+          </a:bodyPr>
+          <a:lstStyle/>
+          <a:p>
+            <a:pPr marL="0" lvl="0" indent="0">
+              <a:buNone/>
+            </a:pPr>
+            <a:r>
+              <a:rPr dirty="0"/>
+              <a:t>The sampling </a:t>
+            </a:r>
+            <a:r>
+              <a:rPr lang="en-US" dirty="0"/>
+              <a:t>statistics</a:t>
+            </a:r>
+            <a:r>
+              <a:rPr dirty="0"/>
+              <a:t> </a:t>
+            </a:r>
+            <a:r>
+              <a:rPr lang="en-US" dirty="0"/>
+              <a:t>are good for all </a:t>
+            </a:r>
+            <a:r>
+              <a:rPr dirty="0"/>
+              <a:t>coefficients</a:t>
+            </a:r>
+          </a:p>
+        </p:txBody>
+      </p:sp>
+      <p:pic>
+        <p:nvPicPr>
+          <p:cNvPr id="6" name="Picture 5">
+            <a:extLst>
+              <a:ext uri="{FF2B5EF4-FFF2-40B4-BE49-F238E27FC236}">
+                <a16:creationId xmlns:a16="http://schemas.microsoft.com/office/drawing/2014/main" id="{90D5E81B-7F65-E085-C8BF-3515C76D8A6F}"/>
+              </a:ext>
+            </a:extLst>
+          </p:cNvPr>
+          <p:cNvPicPr>
+            <a:picLocks noChangeAspect="1"/>
+          </p:cNvPicPr>
+          <p:nvPr/>
+        </p:nvPicPr>
+        <p:blipFill>
+          <a:blip r:embed="rId2"/>
+          <a:stretch>
+            <a:fillRect/>
+          </a:stretch>
+        </p:blipFill>
+        <p:spPr>
+          <a:xfrm>
+            <a:off x="2097292" y="1447800"/>
+            <a:ext cx="4487912" cy="3596640"/>
+          </a:xfrm>
+          <a:prstGeom prst="rect">
+            <a:avLst/>
+          </a:prstGeom>
+        </p:spPr>
+      </p:pic>
+    </p:spTree>
+    <p:extLst>
+      <p:ext uri="{BB962C8B-B14F-4D97-AF65-F5344CB8AC3E}">
+        <p14:creationId xmlns:p14="http://schemas.microsoft.com/office/powerpoint/2010/main" val="1508227925"/>
+      </p:ext>
+    </p:extLst>
   </p:cSld>
   <p:clrMapOvr>
     <a:masterClrMapping/>
@@ -7293,8 +10987,8 @@
           </a:p>
         </p:txBody>
       </p:sp>
-      <mc:AlternateContent xmlns:mc="http://schemas.openxmlformats.org/markup-compatibility/2006">
-        <mc:Choice xmlns:a14="http://schemas.microsoft.com/office/drawing/2010/main" Requires="a14">
+      <mc:AlternateContent xmlns:mc="http://schemas.openxmlformats.org/markup-compatibility/2006" xmlns:a14="http://schemas.microsoft.com/office/drawing/2010/main">
+        <mc:Choice Requires="a14">
           <p:sp>
             <p:nvSpPr>
               <p:cNvPr id="3" name="Content Placeholder 2"/>
@@ -7382,7 +11076,7 @@
             </p:txBody>
           </p:sp>
         </mc:Choice>
-        <mc:Fallback>
+        <mc:Fallback xmlns="">
           <p:sp>
             <p:nvSpPr>
               <p:cNvPr id="3" name="Content Placeholder 2"/>
@@ -7678,8 +11372,8 @@
           </a:p>
         </p:txBody>
       </p:sp>
-      <mc:AlternateContent xmlns:mc="http://schemas.openxmlformats.org/markup-compatibility/2006">
-        <mc:Choice xmlns:a14="http://schemas.microsoft.com/office/drawing/2010/main" Requires="a14">
+      <mc:AlternateContent xmlns:mc="http://schemas.openxmlformats.org/markup-compatibility/2006" xmlns:a14="http://schemas.microsoft.com/office/drawing/2010/main">
+        <mc:Choice Requires="a14">
           <p:sp>
             <p:nvSpPr>
               <p:cNvPr id="3" name="Content Placeholder 2"/>
@@ -7876,7 +11570,7 @@
             </p:txBody>
           </p:sp>
         </mc:Choice>
-        <mc:Fallback>
+        <mc:Fallback xmlns="">
           <p:sp>
             <p:nvSpPr>
               <p:cNvPr id="3" name="Content Placeholder 2"/>
@@ -7959,8 +11653,8 @@
           </a:p>
         </p:txBody>
       </p:sp>
-      <mc:AlternateContent xmlns:mc="http://schemas.openxmlformats.org/markup-compatibility/2006">
-        <mc:Choice xmlns:a14="http://schemas.microsoft.com/office/drawing/2010/main" Requires="a14">
+      <mc:AlternateContent xmlns:mc="http://schemas.openxmlformats.org/markup-compatibility/2006" xmlns:a14="http://schemas.microsoft.com/office/drawing/2010/main">
+        <mc:Choice Requires="a14">
           <p:sp>
             <p:nvSpPr>
               <p:cNvPr id="3" name="Content Placeholder 2"/>
@@ -8056,7 +11750,7 @@
             </p:txBody>
           </p:sp>
         </mc:Choice>
-        <mc:Fallback>
+        <mc:Fallback xmlns="">
           <p:sp>
             <p:nvSpPr>
               <p:cNvPr id="3" name="Content Placeholder 2"/>

</xml_diff>